<commit_message>
7/18/2023: Added notes from today's group discussion.
</commit_message>
<xml_diff>
--- a/Project_3_outline.pptx
+++ b/Project_3_outline.pptx
@@ -6570,7 +6570,7 @@
         </p:spPr>
         <p:txBody>
           <a:bodyPr>
-            <a:normAutofit fontScale="85000" lnSpcReduction="20000"/>
+            <a:normAutofit fontScale="77500" lnSpcReduction="20000"/>
           </a:bodyPr>
           <a:lstStyle/>
           <a:p>
@@ -6582,7 +6582,15 @@
           <a:p>
             <a:r>
               <a:rPr lang="en-US" cap="none" dirty="0"/>
-              <a:t>The project data is limited (scoped) to the state of Minnesota for the diseases (top 3 diseases/illnesses here). </a:t>
+              <a:t>The project data is limited (scoped) to the United States </a:t>
+            </a:r>
+            <a:r>
+              <a:rPr lang="en-US" strike="sngStrike" cap="none" dirty="0"/>
+              <a:t>state of Minnesota </a:t>
+            </a:r>
+            <a:r>
+              <a:rPr lang="en-US" cap="none" dirty="0"/>
+              <a:t>for the diseases (top 3 diseases/illnesses here). </a:t>
             </a:r>
             <a:r>
               <a:rPr lang="en-US" cap="none" dirty="0">
@@ -6598,7 +6606,7 @@
             <a:pPr lvl="1"/>
             <a:r>
               <a:rPr lang="en-US" cap="none" dirty="0"/>
-              <a:t>West Nile Virus (WNV)</a:t>
+              <a:t>West Nile Virus (WNV) – more data here between ticks and mosquitos. Data available yearly per county. Can’t find monthly.</a:t>
             </a:r>
           </a:p>
           <a:p>
@@ -6612,14 +6620,23 @@
             <a:pPr lvl="1"/>
             <a:r>
               <a:rPr lang="en-US" cap="none" dirty="0"/>
-              <a:t>Anaplasmosis/</a:t>
+              <a:t>Anaplasmosis</a:t>
             </a:r>
           </a:p>
           <a:p>
             <a:r>
               <a:rPr lang="en-US" cap="none" dirty="0"/>
-              <a:t>The rate of illnesses/diseases was compared to (watershed data/climate metrics here).</a:t>
-            </a:r>
+              <a:t>The rate of illnesses/diseases was compared to (watershed data/climate metrics here). </a:t>
+            </a:r>
+            <a:r>
+              <a:rPr lang="en-US" cap="none" dirty="0">
+                <a:solidFill>
+                  <a:srgbClr val="FF0000"/>
+                </a:solidFill>
+              </a:rPr>
+              <a:t>Keep it to Temperature mapping. Color range by avg or max temp for that time period (yearly probs).</a:t>
+            </a:r>
+            <a:endParaRPr lang="en-US" cap="none" dirty="0"/>
           </a:p>
           <a:p>
             <a:r>
@@ -6630,8 +6647,12 @@
           <a:p>
             <a:pPr lvl="1"/>
             <a:r>
+              <a:rPr lang="en-US" strike="sngStrike" cap="none" dirty="0"/>
+              <a:t>MN </a:t>
+            </a:r>
+            <a:r>
               <a:rPr lang="en-US" cap="none" dirty="0"/>
-              <a:t>MN DNR</a:t>
+              <a:t>DNR</a:t>
             </a:r>
           </a:p>
           <a:p>
@@ -6661,7 +6682,15 @@
             </a:pPr>
             <a:r>
               <a:rPr lang="en-US" cap="none" dirty="0"/>
-              <a:t>How does (watershed/climate metric) relate to (rates of the individual diseases/illnesses) for different regions of Minnesota?</a:t>
+              <a:t>How does (watershed/climate metric) relate to (rates of the individual diseases/illnesses) for different regions of the US. </a:t>
+            </a:r>
+            <a:r>
+              <a:rPr lang="en-US" strike="sngStrike" cap="none" dirty="0"/>
+              <a:t>Minnesota</a:t>
+            </a:r>
+            <a:r>
+              <a:rPr lang="en-US" cap="none" dirty="0"/>
+              <a:t>?</a:t>
             </a:r>
           </a:p>
           <a:p>
@@ -6776,7 +6805,9 @@
           </a:xfrm>
         </p:spPr>
         <p:txBody>
-          <a:bodyPr/>
+          <a:bodyPr>
+            <a:normAutofit fontScale="85000" lnSpcReduction="10000"/>
+          </a:bodyPr>
           <a:lstStyle/>
           <a:p>
             <a:r>
@@ -6844,6 +6875,33 @@
             <a:r>
               <a:rPr lang="en-US" cap="none" dirty="0"/>
               <a:t>Might be something as simple as a Pareto bar chart of the most prevalent illnesses in Minnesota. That would be a good start to the presentation to show how we narrowed in on our map data visualizations.</a:t>
+            </a:r>
+          </a:p>
+          <a:p>
+            <a:pPr lvl="1"/>
+            <a:r>
+              <a:rPr lang="en-US" b="1" cap="none" dirty="0"/>
+              <a:t>Correlation of illness vs Temperature. Line chart.</a:t>
+            </a:r>
+          </a:p>
+          <a:p>
+            <a:r>
+              <a:rPr lang="en-US" cap="none" dirty="0"/>
+              <a:t>Visual 4: Yearly slider for occurrence of illness or density of mosquitos. Slider might be a plugin we haven’t used yet. </a:t>
+            </a:r>
+            <a:r>
+              <a:rPr lang="en-US" cap="none" dirty="0">
+                <a:solidFill>
+                  <a:srgbClr val="FF0000"/>
+                </a:solidFill>
+              </a:rPr>
+              <a:t>(Kevin to research this) See if we can have that slider auto move on the html page.</a:t>
+            </a:r>
+          </a:p>
+          <a:p>
+            <a:r>
+              <a:rPr lang="en-US" cap="none" dirty="0"/>
+              <a:t>Visual 5: If can’t find exact data, can use proxy variables like google trends data for certain searches. Would be something to visualize.</a:t>
             </a:r>
           </a:p>
         </p:txBody>
@@ -7340,7 +7398,22 @@
             </a:r>
           </a:p>
           <a:p>
-            <a:endParaRPr lang="en-US" dirty="0"/>
+            <a:pPr marL="285750" indent="-285750">
+              <a:buFontTx/>
+              <a:buChar char="-"/>
+            </a:pPr>
+            <a:r>
+              <a:rPr lang="en-US" dirty="0"/>
+              <a:t>Kevin to look into slider as a new </a:t>
+            </a:r>
+            <a:r>
+              <a:rPr lang="en-US" dirty="0" err="1"/>
+              <a:t>Javascript</a:t>
+            </a:r>
+            <a:r>
+              <a:rPr lang="en-US" dirty="0"/>
+              <a:t> library.</a:t>
+            </a:r>
           </a:p>
           <a:p>
             <a:endParaRPr lang="en-US" dirty="0"/>

</xml_diff>

<commit_message>
7/18/2023: Added a resources folder for storing raw data.
</commit_message>
<xml_diff>
--- a/Project_3_outline.pptx
+++ b/Project_3_outline.pptx
@@ -6570,7 +6570,7 @@
         </p:spPr>
         <p:txBody>
           <a:bodyPr>
-            <a:normAutofit fontScale="77500" lnSpcReduction="20000"/>
+            <a:normAutofit fontScale="62500" lnSpcReduction="20000"/>
           </a:bodyPr>
           <a:lstStyle/>
           <a:p>
@@ -6668,6 +6668,24 @@
               <a:rPr lang="en-US" cap="none" dirty="0"/>
               <a:t>(cont. with all other sources)</a:t>
             </a:r>
+          </a:p>
+          <a:p>
+            <a:pPr lvl="1"/>
+            <a:r>
+              <a:rPr lang="en-US" cap="none" dirty="0"/>
+              <a:t>Ryan found a really good NCEI source for temperature mapping.</a:t>
+            </a:r>
+          </a:p>
+          <a:p>
+            <a:pPr lvl="1"/>
+            <a:r>
+              <a:rPr lang="en-US" cap="none" dirty="0"/>
+              <a:t>Miranda found a good lightningchart.com source for Lyme which gives a nice Excel.</a:t>
+            </a:r>
+          </a:p>
+          <a:p>
+            <a:pPr lvl="1"/>
+            <a:endParaRPr lang="en-US" cap="none" dirty="0"/>
           </a:p>
           <a:p>
             <a:r>
@@ -6806,7 +6824,7 @@
         </p:spPr>
         <p:txBody>
           <a:bodyPr>
-            <a:normAutofit fontScale="85000" lnSpcReduction="10000"/>
+            <a:normAutofit fontScale="70000" lnSpcReduction="20000"/>
           </a:bodyPr>
           <a:lstStyle/>
           <a:p>
@@ -6903,6 +6921,28 @@
               <a:rPr lang="en-US" cap="none" dirty="0"/>
               <a:t>Visual 5: If can’t find exact data, can use proxy variables like google trends data for certain searches. Would be something to visualize.</a:t>
             </a:r>
+          </a:p>
+          <a:p>
+            <a:endParaRPr lang="en-US" cap="none" dirty="0"/>
+          </a:p>
+          <a:p>
+            <a:r>
+              <a:rPr lang="en-US" cap="none" dirty="0"/>
+              <a:t>Ryan found the </a:t>
+            </a:r>
+            <a:r>
+              <a:rPr lang="en-US" cap="none" dirty="0" err="1"/>
+              <a:t>GeoJson</a:t>
+            </a:r>
+            <a:r>
+              <a:rPr lang="en-US" cap="none" dirty="0"/>
+              <a:t> for county lines. We would use for </a:t>
+            </a:r>
+            <a:r>
+              <a:rPr lang="en-US" cap="none"/>
+              <a:t>the mapping.</a:t>
+            </a:r>
+            <a:endParaRPr lang="en-US" cap="none" dirty="0"/>
           </a:p>
         </p:txBody>
       </p:sp>

</xml_diff>

<commit_message>
7/18/2023: Added resources folder. Updated outline slide deck per tonight's conversation. Actions are on the Ruberic slide.
</commit_message>
<xml_diff>
--- a/Project_3_outline.pptx
+++ b/Project_3_outline.pptx
@@ -6473,6 +6473,260 @@
           </a:p>
         </p:txBody>
       </p:sp>
+      <p:sp>
+        <p:nvSpPr>
+          <p:cNvPr id="4" name="Subtitle 2">
+            <a:extLst>
+              <a:ext uri="{FF2B5EF4-FFF2-40B4-BE49-F238E27FC236}">
+                <a16:creationId xmlns:a16="http://schemas.microsoft.com/office/drawing/2014/main" id="{C15D2D6C-E8B5-B09C-60A8-971DE2147AA3}"/>
+              </a:ext>
+            </a:extLst>
+          </p:cNvPr>
+          <p:cNvSpPr txBox="1">
+            <a:spLocks/>
+          </p:cNvSpPr>
+          <p:nvPr/>
+        </p:nvSpPr>
+        <p:spPr>
+          <a:xfrm>
+            <a:off x="1631156" y="4654549"/>
+            <a:ext cx="8929688" cy="1371599"/>
+          </a:xfrm>
+          <a:prstGeom prst="rect">
+            <a:avLst/>
+          </a:prstGeom>
+        </p:spPr>
+        <p:txBody>
+          <a:bodyPr vert="horz" lIns="91440" tIns="45720" rIns="91440" bIns="45720" rtlCol="0">
+            <a:normAutofit/>
+          </a:bodyPr>
+          <a:lstStyle>
+            <a:lvl1pPr marL="0" indent="0" algn="ctr" defTabSz="914400" rtl="0" eaLnBrk="1" latinLnBrk="0" hangingPunct="1">
+              <a:lnSpc>
+                <a:spcPct val="120000"/>
+              </a:lnSpc>
+              <a:spcBef>
+                <a:spcPts val="1000"/>
+              </a:spcBef>
+              <a:buClr>
+                <a:schemeClr val="tx1"/>
+              </a:buClr>
+              <a:buFont typeface="Arial" panose="020B0604020202020204" pitchFamily="34" charset="0"/>
+              <a:buNone/>
+              <a:defRPr sz="2200" kern="1200" cap="all" baseline="0">
+                <a:solidFill>
+                  <a:schemeClr val="bg1">
+                    <a:lumMod val="50000"/>
+                  </a:schemeClr>
+                </a:solidFill>
+                <a:effectLst/>
+                <a:latin typeface="+mn-lt"/>
+                <a:ea typeface="+mn-ea"/>
+                <a:cs typeface="+mn-cs"/>
+              </a:defRPr>
+            </a:lvl1pPr>
+            <a:lvl2pPr marL="457200" indent="0" algn="ctr" defTabSz="914400" rtl="0" eaLnBrk="1" latinLnBrk="0" hangingPunct="1">
+              <a:lnSpc>
+                <a:spcPct val="120000"/>
+              </a:lnSpc>
+              <a:spcBef>
+                <a:spcPts val="500"/>
+              </a:spcBef>
+              <a:buClr>
+                <a:schemeClr val="tx1"/>
+              </a:buClr>
+              <a:buFont typeface="Arial" panose="020B0604020202020204" pitchFamily="34" charset="0"/>
+              <a:buNone/>
+              <a:defRPr sz="2000" kern="1200" cap="all" baseline="0">
+                <a:solidFill>
+                  <a:schemeClr val="tx1"/>
+                </a:solidFill>
+                <a:effectLst/>
+                <a:latin typeface="+mn-lt"/>
+                <a:ea typeface="+mn-ea"/>
+                <a:cs typeface="+mn-cs"/>
+              </a:defRPr>
+            </a:lvl2pPr>
+            <a:lvl3pPr marL="914400" indent="0" algn="ctr" defTabSz="914400" rtl="0" eaLnBrk="1" latinLnBrk="0" hangingPunct="1">
+              <a:lnSpc>
+                <a:spcPct val="120000"/>
+              </a:lnSpc>
+              <a:spcBef>
+                <a:spcPts val="500"/>
+              </a:spcBef>
+              <a:buClr>
+                <a:schemeClr val="tx1"/>
+              </a:buClr>
+              <a:buFont typeface="Arial" panose="020B0604020202020204" pitchFamily="34" charset="0"/>
+              <a:buNone/>
+              <a:defRPr sz="1800" kern="1200" cap="all" baseline="0">
+                <a:solidFill>
+                  <a:schemeClr val="tx1"/>
+                </a:solidFill>
+                <a:effectLst/>
+                <a:latin typeface="+mn-lt"/>
+                <a:ea typeface="+mn-ea"/>
+                <a:cs typeface="+mn-cs"/>
+              </a:defRPr>
+            </a:lvl3pPr>
+            <a:lvl4pPr marL="1371600" indent="0" algn="ctr" defTabSz="914400" rtl="0" eaLnBrk="1" latinLnBrk="0" hangingPunct="1">
+              <a:lnSpc>
+                <a:spcPct val="120000"/>
+              </a:lnSpc>
+              <a:spcBef>
+                <a:spcPts val="500"/>
+              </a:spcBef>
+              <a:buClr>
+                <a:schemeClr val="tx1"/>
+              </a:buClr>
+              <a:buFont typeface="Arial" panose="020B0604020202020204" pitchFamily="34" charset="0"/>
+              <a:buNone/>
+              <a:defRPr sz="1600" kern="1200" cap="all" baseline="0">
+                <a:solidFill>
+                  <a:schemeClr val="tx1"/>
+                </a:solidFill>
+                <a:effectLst/>
+                <a:latin typeface="+mn-lt"/>
+                <a:ea typeface="+mn-ea"/>
+                <a:cs typeface="+mn-cs"/>
+              </a:defRPr>
+            </a:lvl4pPr>
+            <a:lvl5pPr marL="1828800" indent="0" algn="ctr" defTabSz="914400" rtl="0" eaLnBrk="1" latinLnBrk="0" hangingPunct="1">
+              <a:lnSpc>
+                <a:spcPct val="120000"/>
+              </a:lnSpc>
+              <a:spcBef>
+                <a:spcPts val="500"/>
+              </a:spcBef>
+              <a:buClr>
+                <a:schemeClr val="tx1"/>
+              </a:buClr>
+              <a:buFont typeface="Arial" panose="020B0604020202020204" pitchFamily="34" charset="0"/>
+              <a:buNone/>
+              <a:defRPr sz="1600" kern="1200" cap="all" baseline="0">
+                <a:solidFill>
+                  <a:schemeClr val="tx1"/>
+                </a:solidFill>
+                <a:effectLst/>
+                <a:latin typeface="+mn-lt"/>
+                <a:ea typeface="+mn-ea"/>
+                <a:cs typeface="+mn-cs"/>
+              </a:defRPr>
+            </a:lvl5pPr>
+            <a:lvl6pPr marL="2286000" indent="0" algn="ctr" defTabSz="914400" rtl="0" eaLnBrk="1" latinLnBrk="0" hangingPunct="1">
+              <a:lnSpc>
+                <a:spcPct val="120000"/>
+              </a:lnSpc>
+              <a:spcBef>
+                <a:spcPts val="500"/>
+              </a:spcBef>
+              <a:buClr>
+                <a:schemeClr val="tx1"/>
+              </a:buClr>
+              <a:buFont typeface="Arial" panose="020B0604020202020204" pitchFamily="34" charset="0"/>
+              <a:buNone/>
+              <a:defRPr sz="1600" kern="1200" cap="all" baseline="0">
+                <a:solidFill>
+                  <a:schemeClr val="tx1"/>
+                </a:solidFill>
+                <a:effectLst/>
+                <a:latin typeface="+mn-lt"/>
+                <a:ea typeface="+mn-ea"/>
+                <a:cs typeface="+mn-cs"/>
+              </a:defRPr>
+            </a:lvl6pPr>
+            <a:lvl7pPr marL="2743200" indent="0" algn="ctr" defTabSz="914400" rtl="0" eaLnBrk="1" latinLnBrk="0" hangingPunct="1">
+              <a:lnSpc>
+                <a:spcPct val="120000"/>
+              </a:lnSpc>
+              <a:spcBef>
+                <a:spcPts val="500"/>
+              </a:spcBef>
+              <a:buClr>
+                <a:schemeClr val="tx1"/>
+              </a:buClr>
+              <a:buFont typeface="Arial" panose="020B0604020202020204" pitchFamily="34" charset="0"/>
+              <a:buNone/>
+              <a:defRPr sz="1600" kern="1200" cap="all" baseline="0">
+                <a:solidFill>
+                  <a:schemeClr val="tx1"/>
+                </a:solidFill>
+                <a:effectLst/>
+                <a:latin typeface="+mn-lt"/>
+                <a:ea typeface="+mn-ea"/>
+                <a:cs typeface="+mn-cs"/>
+              </a:defRPr>
+            </a:lvl7pPr>
+            <a:lvl8pPr marL="3200400" indent="0" algn="ctr" defTabSz="914400" rtl="0" eaLnBrk="1" latinLnBrk="0" hangingPunct="1">
+              <a:lnSpc>
+                <a:spcPct val="120000"/>
+              </a:lnSpc>
+              <a:spcBef>
+                <a:spcPts val="500"/>
+              </a:spcBef>
+              <a:buClr>
+                <a:schemeClr val="tx1"/>
+              </a:buClr>
+              <a:buFont typeface="Arial" panose="020B0604020202020204" pitchFamily="34" charset="0"/>
+              <a:buNone/>
+              <a:defRPr sz="1600" kern="1200" cap="all" baseline="0">
+                <a:solidFill>
+                  <a:schemeClr val="tx1"/>
+                </a:solidFill>
+                <a:effectLst/>
+                <a:latin typeface="+mn-lt"/>
+                <a:ea typeface="+mn-ea"/>
+                <a:cs typeface="+mn-cs"/>
+              </a:defRPr>
+            </a:lvl8pPr>
+            <a:lvl9pPr marL="3657600" indent="0" algn="ctr" defTabSz="914400" rtl="0" eaLnBrk="1" latinLnBrk="0" hangingPunct="1">
+              <a:lnSpc>
+                <a:spcPct val="120000"/>
+              </a:lnSpc>
+              <a:spcBef>
+                <a:spcPts val="500"/>
+              </a:spcBef>
+              <a:buClr>
+                <a:schemeClr val="tx1"/>
+              </a:buClr>
+              <a:buFont typeface="Arial" panose="020B0604020202020204" pitchFamily="34" charset="0"/>
+              <a:buNone/>
+              <a:defRPr sz="1600" kern="1200" cap="all" baseline="0">
+                <a:solidFill>
+                  <a:schemeClr val="tx1"/>
+                </a:solidFill>
+                <a:effectLst/>
+                <a:latin typeface="+mn-lt"/>
+                <a:ea typeface="+mn-ea"/>
+                <a:cs typeface="+mn-cs"/>
+              </a:defRPr>
+            </a:lvl9pPr>
+          </a:lstStyle>
+          <a:p>
+            <a:r>
+              <a:rPr lang="en-US" sz="3200" cap="none" dirty="0">
+                <a:solidFill>
+                  <a:srgbClr val="FF0000"/>
+                </a:solidFill>
+              </a:rPr>
+              <a:t>Presentations are happening on Monday July 31</a:t>
+            </a:r>
+            <a:r>
+              <a:rPr lang="en-US" sz="3200" cap="none" baseline="30000" dirty="0">
+                <a:solidFill>
+                  <a:srgbClr val="FF0000"/>
+                </a:solidFill>
+              </a:rPr>
+              <a:t>st </a:t>
+            </a:r>
+            <a:endParaRPr lang="en-US" sz="3200" cap="none" dirty="0">
+              <a:solidFill>
+                <a:srgbClr val="FF0000"/>
+              </a:solidFill>
+            </a:endParaRPr>
+          </a:p>
+        </p:txBody>
+      </p:sp>
     </p:spTree>
     <p:extLst>
       <p:ext uri="{BB962C8B-B14F-4D97-AF65-F5344CB8AC3E}">
@@ -6936,13 +7190,8 @@
             </a:r>
             <a:r>
               <a:rPr lang="en-US" cap="none" dirty="0"/>
-              <a:t> for county lines. We would use for </a:t>
-            </a:r>
-            <a:r>
-              <a:rPr lang="en-US" cap="none"/>
-              <a:t>the mapping.</a:t>
-            </a:r>
-            <a:endParaRPr lang="en-US" cap="none" dirty="0"/>
+              <a:t> for county lines. We would use for the mapping.</a:t>
+            </a:r>
           </a:p>
         </p:txBody>
       </p:sp>
@@ -7071,8 +7320,8 @@
         </p:nvSpPr>
         <p:spPr>
           <a:xfrm>
-            <a:off x="6191250" y="2131033"/>
-            <a:ext cx="5708963" cy="3970318"/>
+            <a:off x="6191249" y="1149350"/>
+            <a:ext cx="5708963" cy="5509200"/>
           </a:xfrm>
           <a:prstGeom prst="rect">
             <a:avLst/>
@@ -7088,48 +7337,138 @@
           <a:lstStyle/>
           <a:p>
             <a:r>
-              <a:rPr lang="en-US" dirty="0"/>
+              <a:rPr lang="en-US" sz="1600" dirty="0"/>
               <a:t>(Delegated actions here as applicable)</a:t>
             </a:r>
           </a:p>
           <a:p>
-            <a:endParaRPr lang="en-US" dirty="0"/>
-          </a:p>
-          <a:p>
-            <a:endParaRPr lang="en-US" dirty="0"/>
-          </a:p>
-          <a:p>
-            <a:endParaRPr lang="en-US" dirty="0"/>
-          </a:p>
-          <a:p>
-            <a:endParaRPr lang="en-US" dirty="0"/>
-          </a:p>
-          <a:p>
-            <a:endParaRPr lang="en-US" dirty="0"/>
-          </a:p>
-          <a:p>
-            <a:endParaRPr lang="en-US" dirty="0"/>
-          </a:p>
-          <a:p>
-            <a:endParaRPr lang="en-US" dirty="0"/>
-          </a:p>
-          <a:p>
-            <a:endParaRPr lang="en-US" dirty="0"/>
-          </a:p>
-          <a:p>
-            <a:endParaRPr lang="en-US" dirty="0"/>
-          </a:p>
-          <a:p>
-            <a:endParaRPr lang="en-US" dirty="0"/>
-          </a:p>
-          <a:p>
-            <a:endParaRPr lang="en-US" dirty="0"/>
-          </a:p>
-          <a:p>
-            <a:endParaRPr lang="en-US" dirty="0"/>
-          </a:p>
-          <a:p>
-            <a:endParaRPr lang="en-US" dirty="0"/>
+            <a:r>
+              <a:rPr lang="en-US" sz="1600" dirty="0"/>
+              <a:t>- Ryan is doing web scraping of table data for county cases of West Nile (</a:t>
+            </a:r>
+            <a:r>
+              <a:rPr lang="en-US" sz="1600" dirty="0" err="1"/>
+              <a:t>lymes</a:t>
+            </a:r>
+            <a:r>
+              <a:rPr lang="en-US" sz="1600" dirty="0"/>
+              <a:t>?). Make look similar to Lyme disease data.</a:t>
+            </a:r>
+          </a:p>
+          <a:p>
+            <a:r>
+              <a:rPr lang="en-US" sz="1600" dirty="0"/>
+              <a:t>	- So we’ll have all county data for West Nile and </a:t>
+            </a:r>
+            <a:r>
+              <a:rPr lang="en-US" sz="1600" dirty="0" err="1"/>
+              <a:t>Lymes</a:t>
+            </a:r>
+            <a:r>
+              <a:rPr lang="en-US" sz="1600" dirty="0"/>
+              <a:t> by 	county by year. Nice!</a:t>
+            </a:r>
+          </a:p>
+          <a:p>
+            <a:r>
+              <a:rPr lang="en-US" sz="1600" dirty="0"/>
+              <a:t>	</a:t>
+            </a:r>
+          </a:p>
+          <a:p>
+            <a:r>
+              <a:rPr lang="en-US" sz="1600" dirty="0"/>
+              <a:t>- Ryan getting </a:t>
+            </a:r>
+            <a:r>
+              <a:rPr lang="en-US" sz="1600" dirty="0" err="1"/>
+              <a:t>GeoJSON</a:t>
+            </a:r>
+            <a:r>
+              <a:rPr lang="en-US" sz="1600" dirty="0"/>
+              <a:t> and adding to github.</a:t>
+            </a:r>
+          </a:p>
+          <a:p>
+            <a:r>
+              <a:rPr lang="en-US" sz="1600" dirty="0"/>
+              <a:t>	- Will also have county line maps for </a:t>
+            </a:r>
+            <a:r>
+              <a:rPr lang="en-US" sz="1600" dirty="0" err="1"/>
+              <a:t>GeoJSON</a:t>
+            </a:r>
+            <a:r>
+              <a:rPr lang="en-US" sz="1600" dirty="0"/>
+              <a:t>.</a:t>
+            </a:r>
+          </a:p>
+          <a:p>
+            <a:endParaRPr lang="en-US" sz="1600" dirty="0"/>
+          </a:p>
+          <a:p>
+            <a:pPr marL="285750" indent="-285750">
+              <a:buFontTx/>
+              <a:buChar char="-"/>
+            </a:pPr>
+            <a:r>
+              <a:rPr lang="en-US" sz="1600" dirty="0"/>
+              <a:t>Evan to build SQL tables for the West Nile and </a:t>
+            </a:r>
+            <a:r>
+              <a:rPr lang="en-US" sz="1600" dirty="0" err="1"/>
+              <a:t>Lymes</a:t>
+            </a:r>
+            <a:r>
+              <a:rPr lang="en-US" sz="1600" dirty="0"/>
+              <a:t> in PostgreSQL. </a:t>
+            </a:r>
+          </a:p>
+          <a:p>
+            <a:endParaRPr lang="en-US" sz="1600" dirty="0"/>
+          </a:p>
+          <a:p>
+            <a:pPr marL="285750" indent="-285750">
+              <a:buFontTx/>
+              <a:buChar char="-"/>
+            </a:pPr>
+            <a:r>
+              <a:rPr lang="en-US" sz="1600" dirty="0"/>
+              <a:t>Kevin will research JavaScript library/plugin for the mapping visualization year slider.</a:t>
+            </a:r>
+          </a:p>
+          <a:p>
+            <a:endParaRPr lang="en-US" sz="1600" dirty="0"/>
+          </a:p>
+          <a:p>
+            <a:pPr marL="285750" indent="-285750">
+              <a:buFontTx/>
+              <a:buChar char="-"/>
+            </a:pPr>
+            <a:r>
+              <a:rPr lang="en-US" sz="1600" dirty="0"/>
+              <a:t>Timothy to look into getting Temp data by county by year. Extract from NCEI site. Get into a bulk CSV for our year range of 2000 – 2020. Get avg monthly temp data for 3 months centered around August per county for year range.</a:t>
+            </a:r>
+          </a:p>
+          <a:p>
+            <a:pPr marL="285750" indent="-285750">
+              <a:buFontTx/>
+              <a:buChar char="-"/>
+            </a:pPr>
+            <a:r>
+              <a:rPr lang="en-US" sz="1600" dirty="0"/>
+              <a:t>And get precipitation (total rainfall) for those same ranges.</a:t>
+            </a:r>
+          </a:p>
+          <a:p>
+            <a:pPr marL="742950" lvl="1" indent="-285750">
+              <a:buFontTx/>
+              <a:buChar char="-"/>
+            </a:pPr>
+            <a:r>
+              <a:rPr lang="en-US" sz="1600" dirty="0"/>
+              <a:t>Evan and Timothy to pseudocode this and start work on this week. See if it doesn’t get too heady in the workload.</a:t>
+            </a:r>
           </a:p>
         </p:txBody>
       </p:sp>

</xml_diff>

<commit_message>
7/22/2023: Pushing slide deck outline updates. Config.ini update.
</commit_message>
<xml_diff>
--- a/Project_3_outline.pptx
+++ b/Project_3_outline.pptx
@@ -8,10 +8,11 @@
     <p:sldId id="256" r:id="rId2"/>
     <p:sldId id="261" r:id="rId3"/>
     <p:sldId id="259" r:id="rId4"/>
-    <p:sldId id="260" r:id="rId5"/>
-    <p:sldId id="262" r:id="rId6"/>
-    <p:sldId id="263" r:id="rId7"/>
-    <p:sldId id="264" r:id="rId8"/>
+    <p:sldId id="265" r:id="rId5"/>
+    <p:sldId id="260" r:id="rId6"/>
+    <p:sldId id="262" r:id="rId7"/>
+    <p:sldId id="263" r:id="rId8"/>
+    <p:sldId id="264" r:id="rId9"/>
   </p:sldIdLst>
   <p:sldSz cx="12192000" cy="6858000"/>
   <p:notesSz cx="6858000" cy="9144000"/>
@@ -357,7 +358,7 @@
           <a:p>
             <a:fld id="{EDD99DFF-4D7C-4671-8EF0-23A72D1484EC}" type="datetimeFigureOut">
               <a:rPr lang="en-US" smtClean="0"/>
-              <a:t>7/18/2023</a:t>
+              <a:t>7/20/2023</a:t>
             </a:fld>
             <a:endParaRPr lang="en-US"/>
           </a:p>
@@ -669,7 +670,7 @@
           <a:p>
             <a:fld id="{EDD99DFF-4D7C-4671-8EF0-23A72D1484EC}" type="datetimeFigureOut">
               <a:rPr lang="en-US" smtClean="0"/>
-              <a:t>7/18/2023</a:t>
+              <a:t>7/20/2023</a:t>
             </a:fld>
             <a:endParaRPr lang="en-US"/>
           </a:p>
@@ -891,7 +892,7 @@
           <a:p>
             <a:fld id="{EDD99DFF-4D7C-4671-8EF0-23A72D1484EC}" type="datetimeFigureOut">
               <a:rPr lang="en-US" smtClean="0"/>
-              <a:t>7/18/2023</a:t>
+              <a:t>7/20/2023</a:t>
             </a:fld>
             <a:endParaRPr lang="en-US"/>
           </a:p>
@@ -1182,7 +1183,7 @@
           <a:p>
             <a:fld id="{EDD99DFF-4D7C-4671-8EF0-23A72D1484EC}" type="datetimeFigureOut">
               <a:rPr lang="en-US" smtClean="0"/>
-              <a:t>7/18/2023</a:t>
+              <a:t>7/20/2023</a:t>
             </a:fld>
             <a:endParaRPr lang="en-US"/>
           </a:p>
@@ -1636,7 +1637,7 @@
           <a:p>
             <a:fld id="{EDD99DFF-4D7C-4671-8EF0-23A72D1484EC}" type="datetimeFigureOut">
               <a:rPr lang="en-US" smtClean="0"/>
-              <a:t>7/18/2023</a:t>
+              <a:t>7/20/2023</a:t>
             </a:fld>
             <a:endParaRPr lang="en-US"/>
           </a:p>
@@ -2212,7 +2213,7 @@
           <a:p>
             <a:fld id="{EDD99DFF-4D7C-4671-8EF0-23A72D1484EC}" type="datetimeFigureOut">
               <a:rPr lang="en-US" smtClean="0"/>
-              <a:t>7/18/2023</a:t>
+              <a:t>7/20/2023</a:t>
             </a:fld>
             <a:endParaRPr lang="en-US"/>
           </a:p>
@@ -3064,7 +3065,7 @@
           <a:p>
             <a:fld id="{EDD99DFF-4D7C-4671-8EF0-23A72D1484EC}" type="datetimeFigureOut">
               <a:rPr lang="en-US" smtClean="0"/>
-              <a:t>7/18/2023</a:t>
+              <a:t>7/20/2023</a:t>
             </a:fld>
             <a:endParaRPr lang="en-US"/>
           </a:p>
@@ -3269,7 +3270,7 @@
           <a:p>
             <a:fld id="{EDD99DFF-4D7C-4671-8EF0-23A72D1484EC}" type="datetimeFigureOut">
               <a:rPr lang="en-US" smtClean="0"/>
-              <a:t>7/18/2023</a:t>
+              <a:t>7/20/2023</a:t>
             </a:fld>
             <a:endParaRPr lang="en-US"/>
           </a:p>
@@ -3483,7 +3484,7 @@
           <a:p>
             <a:fld id="{EDD99DFF-4D7C-4671-8EF0-23A72D1484EC}" type="datetimeFigureOut">
               <a:rPr lang="en-US" smtClean="0"/>
-              <a:t>7/18/2023</a:t>
+              <a:t>7/20/2023</a:t>
             </a:fld>
             <a:endParaRPr lang="en-US"/>
           </a:p>
@@ -3653,7 +3654,7 @@
           <a:p>
             <a:fld id="{EDD99DFF-4D7C-4671-8EF0-23A72D1484EC}" type="datetimeFigureOut">
               <a:rPr lang="en-US" smtClean="0"/>
-              <a:t>7/18/2023</a:t>
+              <a:t>7/20/2023</a:t>
             </a:fld>
             <a:endParaRPr lang="en-US"/>
           </a:p>
@@ -3858,7 +3859,7 @@
           <a:p>
             <a:fld id="{EDD99DFF-4D7C-4671-8EF0-23A72D1484EC}" type="datetimeFigureOut">
               <a:rPr lang="en-US" smtClean="0"/>
-              <a:t>7/18/2023</a:t>
+              <a:t>7/20/2023</a:t>
             </a:fld>
             <a:endParaRPr lang="en-US"/>
           </a:p>
@@ -4138,7 +4139,7 @@
           <a:p>
             <a:fld id="{EDD99DFF-4D7C-4671-8EF0-23A72D1484EC}" type="datetimeFigureOut">
               <a:rPr lang="en-US" smtClean="0"/>
-              <a:t>7/18/2023</a:t>
+              <a:t>7/20/2023</a:t>
             </a:fld>
             <a:endParaRPr lang="en-US"/>
           </a:p>
@@ -4405,7 +4406,7 @@
           <a:p>
             <a:fld id="{EDD99DFF-4D7C-4671-8EF0-23A72D1484EC}" type="datetimeFigureOut">
               <a:rPr lang="en-US" smtClean="0"/>
-              <a:t>7/18/2023</a:t>
+              <a:t>7/20/2023</a:t>
             </a:fld>
             <a:endParaRPr lang="en-US"/>
           </a:p>
@@ -4820,7 +4821,7 @@
           <a:p>
             <a:fld id="{EDD99DFF-4D7C-4671-8EF0-23A72D1484EC}" type="datetimeFigureOut">
               <a:rPr lang="en-US" smtClean="0"/>
-              <a:t>7/18/2023</a:t>
+              <a:t>7/20/2023</a:t>
             </a:fld>
             <a:endParaRPr lang="en-US"/>
           </a:p>
@@ -4968,7 +4969,7 @@
           <a:p>
             <a:fld id="{EDD99DFF-4D7C-4671-8EF0-23A72D1484EC}" type="datetimeFigureOut">
               <a:rPr lang="en-US" smtClean="0"/>
-              <a:t>7/18/2023</a:t>
+              <a:t>7/20/2023</a:t>
             </a:fld>
             <a:endParaRPr lang="en-US"/>
           </a:p>
@@ -5093,7 +5094,7 @@
           <a:p>
             <a:fld id="{EDD99DFF-4D7C-4671-8EF0-23A72D1484EC}" type="datetimeFigureOut">
               <a:rPr lang="en-US" smtClean="0"/>
-              <a:t>7/18/2023</a:t>
+              <a:t>7/20/2023</a:t>
             </a:fld>
             <a:endParaRPr lang="en-US"/>
           </a:p>
@@ -5372,7 +5373,7 @@
           <a:p>
             <a:fld id="{EDD99DFF-4D7C-4671-8EF0-23A72D1484EC}" type="datetimeFigureOut">
               <a:rPr lang="en-US" smtClean="0"/>
-              <a:t>7/18/2023</a:t>
+              <a:t>7/20/2023</a:t>
             </a:fld>
             <a:endParaRPr lang="en-US"/>
           </a:p>
@@ -5684,7 +5685,7 @@
           <a:p>
             <a:fld id="{EDD99DFF-4D7C-4671-8EF0-23A72D1484EC}" type="datetimeFigureOut">
               <a:rPr lang="en-US" smtClean="0"/>
-              <a:t>7/18/2023</a:t>
+              <a:t>7/20/2023</a:t>
             </a:fld>
             <a:endParaRPr lang="en-US"/>
           </a:p>
@@ -5937,7 +5938,7 @@
           <a:p>
             <a:fld id="{EDD99DFF-4D7C-4671-8EF0-23A72D1484EC}" type="datetimeFigureOut">
               <a:rPr lang="en-US" smtClean="0"/>
-              <a:t>7/18/2023</a:t>
+              <a:t>7/20/2023</a:t>
             </a:fld>
             <a:endParaRPr lang="en-US"/>
           </a:p>
@@ -7227,6 +7228,183 @@
       </p:grpSpPr>
       <p:sp>
         <p:nvSpPr>
+          <p:cNvPr id="3" name="Title 2">
+            <a:extLst>
+              <a:ext uri="{FF2B5EF4-FFF2-40B4-BE49-F238E27FC236}">
+                <a16:creationId xmlns:a16="http://schemas.microsoft.com/office/drawing/2014/main" id="{3F50DE42-68C4-BBEC-94B9-26C3BBA14C3D}"/>
+              </a:ext>
+            </a:extLst>
+          </p:cNvPr>
+          <p:cNvSpPr>
+            <a:spLocks noGrp="1"/>
+          </p:cNvSpPr>
+          <p:nvPr>
+            <p:ph type="title"/>
+          </p:nvPr>
+        </p:nvSpPr>
+        <p:spPr>
+          <a:xfrm>
+            <a:off x="838200" y="173037"/>
+            <a:ext cx="10515600" cy="931863"/>
+          </a:xfrm>
+        </p:spPr>
+        <p:txBody>
+          <a:bodyPr/>
+          <a:lstStyle/>
+          <a:p>
+            <a:r>
+              <a:rPr lang="en-US" cap="none" dirty="0"/>
+              <a:t>Notes from Instructor</a:t>
+            </a:r>
+          </a:p>
+        </p:txBody>
+      </p:sp>
+      <p:sp>
+        <p:nvSpPr>
+          <p:cNvPr id="4" name="Content Placeholder 3">
+            <a:extLst>
+              <a:ext uri="{FF2B5EF4-FFF2-40B4-BE49-F238E27FC236}">
+                <a16:creationId xmlns:a16="http://schemas.microsoft.com/office/drawing/2014/main" id="{4D074976-D577-F42F-637B-979E8769E1C7}"/>
+              </a:ext>
+            </a:extLst>
+          </p:cNvPr>
+          <p:cNvSpPr>
+            <a:spLocks noGrp="1"/>
+          </p:cNvSpPr>
+          <p:nvPr>
+            <p:ph idx="1"/>
+          </p:nvPr>
+        </p:nvSpPr>
+        <p:spPr>
+          <a:xfrm>
+            <a:off x="838200" y="1104900"/>
+            <a:ext cx="10515600" cy="5072063"/>
+          </a:xfrm>
+        </p:spPr>
+        <p:txBody>
+          <a:bodyPr>
+            <a:normAutofit/>
+          </a:bodyPr>
+          <a:lstStyle/>
+          <a:p>
+            <a:pPr algn="l"/>
+            <a:r>
+              <a:rPr lang="en-US" b="0" i="0" cap="none" dirty="0">
+                <a:effectLst/>
+                <a:latin typeface="Slack-Lato"/>
+              </a:rPr>
+              <a:t>I've had this discussion with a couple/few groups already, so I wanted to document this here for everyone. Because we can't deploy a Flask API to Github Pages, here is my recommended approach to the overall project and how to break it up into chunks.</a:t>
+            </a:r>
+          </a:p>
+          <a:p>
+            <a:pPr lvl="1">
+              <a:buFont typeface="+mj-lt"/>
+              <a:buAutoNum type="arabicPeriod"/>
+            </a:pPr>
+            <a:r>
+              <a:rPr lang="en-US" b="0" i="0" cap="none" dirty="0">
+                <a:effectLst/>
+                <a:latin typeface="Slack-Lato"/>
+              </a:rPr>
+              <a:t>ETL to pull your data in, clean it up, and send it off to your database.</a:t>
+            </a:r>
+          </a:p>
+          <a:p>
+            <a:pPr lvl="1">
+              <a:buFont typeface="+mj-lt"/>
+              <a:buAutoNum type="arabicPeriod"/>
+            </a:pPr>
+            <a:r>
+              <a:rPr lang="en-US" b="0" i="0" cap="none" dirty="0">
+                <a:effectLst/>
+                <a:latin typeface="Slack-Lato"/>
+              </a:rPr>
+              <a:t>Flask API to interact with your database.</a:t>
+            </a:r>
+          </a:p>
+          <a:p>
+            <a:pPr lvl="1">
+              <a:buFont typeface="+mj-lt"/>
+              <a:buAutoNum type="arabicPeriod"/>
+            </a:pPr>
+            <a:r>
+              <a:rPr lang="en-US" b="0" i="0" cap="none" dirty="0">
+                <a:effectLst/>
+                <a:latin typeface="Slack-Lato"/>
+              </a:rPr>
+              <a:t>Jupyter Notebook to call your Flask API and get the results you need for your visualization.</a:t>
+            </a:r>
+          </a:p>
+          <a:p>
+            <a:pPr lvl="1">
+              <a:buFont typeface="+mj-lt"/>
+              <a:buAutoNum type="arabicPeriod"/>
+            </a:pPr>
+            <a:r>
+              <a:rPr lang="en-US" b="0" i="0" cap="none" dirty="0">
+                <a:effectLst/>
+                <a:latin typeface="Slack-Lato"/>
+              </a:rPr>
+              <a:t>Save those results as raw JSON.</a:t>
+            </a:r>
+          </a:p>
+          <a:p>
+            <a:pPr lvl="1">
+              <a:buFont typeface="+mj-lt"/>
+              <a:buAutoNum type="arabicPeriod"/>
+            </a:pPr>
+            <a:r>
+              <a:rPr lang="en-US" b="0" i="0" cap="none" dirty="0">
+                <a:effectLst/>
+                <a:latin typeface="Slack-Lato"/>
+              </a:rPr>
+              <a:t>Consume your raw JSON with d3 in your project's JavaScript.</a:t>
+            </a:r>
+          </a:p>
+          <a:p>
+            <a:pPr algn="l"/>
+            <a:r>
+              <a:rPr lang="en-US" b="0" i="0" cap="none" dirty="0">
+                <a:effectLst/>
+                <a:latin typeface="Slack-Lato"/>
+              </a:rPr>
+              <a:t>Steps 1, 2, and 3 would all run on your local machine. They would still be in your Github repository, but they wouldn't be specifically "executed" while interacting with your data. I am going to cover at the start of class on Monday how to deploy a Flask API to a cloud provider. The bootcamp used to use Heroku, but there is no longer a free offering available from Heroku.</a:t>
+            </a:r>
+          </a:p>
+        </p:txBody>
+      </p:sp>
+    </p:spTree>
+    <p:extLst>
+      <p:ext uri="{BB962C8B-B14F-4D97-AF65-F5344CB8AC3E}">
+        <p14:creationId xmlns:p14="http://schemas.microsoft.com/office/powerpoint/2010/main" val="3944814343"/>
+      </p:ext>
+    </p:extLst>
+  </p:cSld>
+  <p:clrMapOvr>
+    <a:masterClrMapping/>
+  </p:clrMapOvr>
+</p:sld>
+</file>
+
+<file path=ppt/slides/slide5.xml><?xml version="1.0" encoding="utf-8"?>
+<p:sld xmlns:a="http://schemas.openxmlformats.org/drawingml/2006/main" xmlns:r="http://schemas.openxmlformats.org/officeDocument/2006/relationships" xmlns:p="http://schemas.openxmlformats.org/presentationml/2006/main">
+  <p:cSld>
+    <p:spTree>
+      <p:nvGrpSpPr>
+        <p:cNvPr id="1" name=""/>
+        <p:cNvGrpSpPr/>
+        <p:nvPr/>
+      </p:nvGrpSpPr>
+      <p:grpSpPr>
+        <a:xfrm>
+          <a:off x="0" y="0"/>
+          <a:ext cx="0" cy="0"/>
+          <a:chOff x="0" y="0"/>
+          <a:chExt cx="0" cy="0"/>
+        </a:xfrm>
+      </p:grpSpPr>
+      <p:sp>
+        <p:nvSpPr>
           <p:cNvPr id="2" name="Title 1">
             <a:extLst>
               <a:ext uri="{FF2B5EF4-FFF2-40B4-BE49-F238E27FC236}">
@@ -7321,7 +7499,7 @@
         <p:spPr>
           <a:xfrm>
             <a:off x="6191249" y="1149350"/>
-            <a:ext cx="5708963" cy="5509200"/>
+            <a:ext cx="5708963" cy="6001643"/>
           </a:xfrm>
           <a:prstGeom prst="rect">
             <a:avLst/>
@@ -7344,7 +7522,7 @@
           <a:p>
             <a:r>
               <a:rPr lang="en-US" sz="1600" dirty="0"/>
-              <a:t>- Ryan is doing web scraping of table data for county cases of West Nile (</a:t>
+              <a:t>- Ryan is doing web scraping of table data for county cases of West  Nile (</a:t>
             </a:r>
             <a:r>
               <a:rPr lang="en-US" sz="1600" dirty="0" err="1"/>
@@ -7370,10 +7548,7 @@
             </a:r>
           </a:p>
           <a:p>
-            <a:r>
-              <a:rPr lang="en-US" sz="1600" dirty="0"/>
-              <a:t>	</a:t>
-            </a:r>
+            <a:endParaRPr lang="en-US" sz="1600" dirty="0"/>
           </a:p>
           <a:p>
             <a:r>
@@ -7401,6 +7576,42 @@
             <a:r>
               <a:rPr lang="en-US" sz="1600" dirty="0"/>
               <a:t>.</a:t>
+            </a:r>
+          </a:p>
+          <a:p>
+            <a:r>
+              <a:rPr lang="en-US" sz="1600" dirty="0"/>
+              <a:t>	- Scraping for West Nile and </a:t>
+            </a:r>
+            <a:r>
+              <a:rPr lang="en-US" sz="1600" dirty="0" err="1"/>
+              <a:t>and</a:t>
+            </a:r>
+            <a:r>
+              <a:rPr lang="en-US" sz="1600" dirty="0"/>
+              <a:t> </a:t>
+            </a:r>
+            <a:r>
+              <a:rPr lang="en-US" sz="1600" dirty="0" err="1"/>
+              <a:t>lyme</a:t>
+            </a:r>
+            <a:r>
+              <a:rPr lang="en-US" sz="1600" dirty="0"/>
+              <a:t> in-process.</a:t>
+            </a:r>
+          </a:p>
+          <a:p>
+            <a:r>
+              <a:rPr lang="en-US" sz="1600" dirty="0"/>
+              <a:t>	- </a:t>
+            </a:r>
+            <a:r>
+              <a:rPr lang="en-US" sz="1600" dirty="0" err="1"/>
+              <a:t>GeoJSON</a:t>
+            </a:r>
+            <a:r>
+              <a:rPr lang="en-US" sz="1600" dirty="0"/>
+              <a:t> in-process.</a:t>
             </a:r>
           </a:p>
           <a:p>
@@ -7451,23 +7662,23 @@
             </a:r>
           </a:p>
           <a:p>
+            <a:pPr marL="742950" lvl="1" indent="-285750">
+              <a:buFontTx/>
+              <a:buChar char="-"/>
+            </a:pPr>
+            <a:r>
+              <a:rPr lang="en-US" sz="1600" dirty="0"/>
+              <a:t>Need to write to CSV and output to Resources folder.</a:t>
+            </a:r>
+          </a:p>
+          <a:p>
             <a:pPr marL="285750" indent="-285750">
               <a:buFontTx/>
               <a:buChar char="-"/>
             </a:pPr>
             <a:r>
               <a:rPr lang="en-US" sz="1600" dirty="0"/>
-              <a:t>And get precipitation (total rainfall) for those same ranges.</a:t>
-            </a:r>
-          </a:p>
-          <a:p>
-            <a:pPr marL="742950" lvl="1" indent="-285750">
-              <a:buFontTx/>
-              <a:buChar char="-"/>
-            </a:pPr>
-            <a:r>
-              <a:rPr lang="en-US" sz="1600" dirty="0"/>
-              <a:t>Evan and Timothy to pseudocode this and start work on this week. See if it doesn’t get too heady in the workload.</a:t>
+              <a:t>And get precipitation (total rainfall) for those same ranges. (should be quick)</a:t>
             </a:r>
           </a:p>
         </p:txBody>
@@ -7643,7 +7854,7 @@
 </p:sld>
 </file>
 
-<file path=ppt/slides/slide5.xml><?xml version="1.0" encoding="utf-8"?>
+<file path=ppt/slides/slide6.xml><?xml version="1.0" encoding="utf-8"?>
 <p:sld xmlns:a="http://schemas.openxmlformats.org/drawingml/2006/main" xmlns:r="http://schemas.openxmlformats.org/officeDocument/2006/relationships" xmlns:p="http://schemas.openxmlformats.org/presentationml/2006/main">
   <p:cSld>
     <p:spTree>
@@ -8042,7 +8253,7 @@
 </p:sld>
 </file>
 
-<file path=ppt/slides/slide6.xml><?xml version="1.0" encoding="utf-8"?>
+<file path=ppt/slides/slide7.xml><?xml version="1.0" encoding="utf-8"?>
 <p:sld xmlns:a="http://schemas.openxmlformats.org/drawingml/2006/main" xmlns:r="http://schemas.openxmlformats.org/officeDocument/2006/relationships" xmlns:p="http://schemas.openxmlformats.org/presentationml/2006/main">
   <p:cSld>
     <p:spTree>
@@ -8155,7 +8366,7 @@
         <p:spPr>
           <a:xfrm>
             <a:off x="6191250" y="2131033"/>
-            <a:ext cx="5708963" cy="2031325"/>
+            <a:ext cx="5708963" cy="3139321"/>
           </a:xfrm>
           <a:prstGeom prst="rect">
             <a:avLst/>
@@ -8182,6 +8393,15 @@
             <a:r>
               <a:rPr lang="en-US" dirty="0"/>
               <a:t>We can use those times to review flow of the slide deck as time allows.</a:t>
+            </a:r>
+          </a:p>
+          <a:p>
+            <a:endParaRPr lang="en-US" dirty="0"/>
+          </a:p>
+          <a:p>
+            <a:r>
+              <a:rPr lang="en-US" dirty="0"/>
+              <a:t>Might need to see if we can “gray out” counties that didn’t report.  Add null counties to list to be a gray layer in the visual (if able).</a:t>
             </a:r>
           </a:p>
           <a:p>
@@ -8360,7 +8580,7 @@
 </p:sld>
 </file>
 
-<file path=ppt/slides/slide7.xml><?xml version="1.0" encoding="utf-8"?>
+<file path=ppt/slides/slide8.xml><?xml version="1.0" encoding="utf-8"?>
 <p:sld xmlns:a="http://schemas.openxmlformats.org/drawingml/2006/main" xmlns:r="http://schemas.openxmlformats.org/officeDocument/2006/relationships" xmlns:p="http://schemas.openxmlformats.org/presentationml/2006/main">
   <p:cSld>
     <p:spTree>

</xml_diff>

<commit_message>
ERS: Removed index from precip and temp csv outputs and updated output csv path to Data folder. Minor updates to config.ini and .gitignore.
</commit_message>
<xml_diff>
--- a/Project_3_outline.pptx
+++ b/Project_3_outline.pptx
@@ -358,7 +358,7 @@
           <a:p>
             <a:fld id="{EDD99DFF-4D7C-4671-8EF0-23A72D1484EC}" type="datetimeFigureOut">
               <a:rPr lang="en-US" smtClean="0"/>
-              <a:t>7/20/2023</a:t>
+              <a:t>7/23/2023</a:t>
             </a:fld>
             <a:endParaRPr lang="en-US"/>
           </a:p>
@@ -670,7 +670,7 @@
           <a:p>
             <a:fld id="{EDD99DFF-4D7C-4671-8EF0-23A72D1484EC}" type="datetimeFigureOut">
               <a:rPr lang="en-US" smtClean="0"/>
-              <a:t>7/20/2023</a:t>
+              <a:t>7/23/2023</a:t>
             </a:fld>
             <a:endParaRPr lang="en-US"/>
           </a:p>
@@ -892,7 +892,7 @@
           <a:p>
             <a:fld id="{EDD99DFF-4D7C-4671-8EF0-23A72D1484EC}" type="datetimeFigureOut">
               <a:rPr lang="en-US" smtClean="0"/>
-              <a:t>7/20/2023</a:t>
+              <a:t>7/23/2023</a:t>
             </a:fld>
             <a:endParaRPr lang="en-US"/>
           </a:p>
@@ -1183,7 +1183,7 @@
           <a:p>
             <a:fld id="{EDD99DFF-4D7C-4671-8EF0-23A72D1484EC}" type="datetimeFigureOut">
               <a:rPr lang="en-US" smtClean="0"/>
-              <a:t>7/20/2023</a:t>
+              <a:t>7/23/2023</a:t>
             </a:fld>
             <a:endParaRPr lang="en-US"/>
           </a:p>
@@ -1637,7 +1637,7 @@
           <a:p>
             <a:fld id="{EDD99DFF-4D7C-4671-8EF0-23A72D1484EC}" type="datetimeFigureOut">
               <a:rPr lang="en-US" smtClean="0"/>
-              <a:t>7/20/2023</a:t>
+              <a:t>7/23/2023</a:t>
             </a:fld>
             <a:endParaRPr lang="en-US"/>
           </a:p>
@@ -2213,7 +2213,7 @@
           <a:p>
             <a:fld id="{EDD99DFF-4D7C-4671-8EF0-23A72D1484EC}" type="datetimeFigureOut">
               <a:rPr lang="en-US" smtClean="0"/>
-              <a:t>7/20/2023</a:t>
+              <a:t>7/23/2023</a:t>
             </a:fld>
             <a:endParaRPr lang="en-US"/>
           </a:p>
@@ -3065,7 +3065,7 @@
           <a:p>
             <a:fld id="{EDD99DFF-4D7C-4671-8EF0-23A72D1484EC}" type="datetimeFigureOut">
               <a:rPr lang="en-US" smtClean="0"/>
-              <a:t>7/20/2023</a:t>
+              <a:t>7/23/2023</a:t>
             </a:fld>
             <a:endParaRPr lang="en-US"/>
           </a:p>
@@ -3270,7 +3270,7 @@
           <a:p>
             <a:fld id="{EDD99DFF-4D7C-4671-8EF0-23A72D1484EC}" type="datetimeFigureOut">
               <a:rPr lang="en-US" smtClean="0"/>
-              <a:t>7/20/2023</a:t>
+              <a:t>7/23/2023</a:t>
             </a:fld>
             <a:endParaRPr lang="en-US"/>
           </a:p>
@@ -3484,7 +3484,7 @@
           <a:p>
             <a:fld id="{EDD99DFF-4D7C-4671-8EF0-23A72D1484EC}" type="datetimeFigureOut">
               <a:rPr lang="en-US" smtClean="0"/>
-              <a:t>7/20/2023</a:t>
+              <a:t>7/23/2023</a:t>
             </a:fld>
             <a:endParaRPr lang="en-US"/>
           </a:p>
@@ -3654,7 +3654,7 @@
           <a:p>
             <a:fld id="{EDD99DFF-4D7C-4671-8EF0-23A72D1484EC}" type="datetimeFigureOut">
               <a:rPr lang="en-US" smtClean="0"/>
-              <a:t>7/20/2023</a:t>
+              <a:t>7/23/2023</a:t>
             </a:fld>
             <a:endParaRPr lang="en-US"/>
           </a:p>
@@ -3859,7 +3859,7 @@
           <a:p>
             <a:fld id="{EDD99DFF-4D7C-4671-8EF0-23A72D1484EC}" type="datetimeFigureOut">
               <a:rPr lang="en-US" smtClean="0"/>
-              <a:t>7/20/2023</a:t>
+              <a:t>7/23/2023</a:t>
             </a:fld>
             <a:endParaRPr lang="en-US"/>
           </a:p>
@@ -4139,7 +4139,7 @@
           <a:p>
             <a:fld id="{EDD99DFF-4D7C-4671-8EF0-23A72D1484EC}" type="datetimeFigureOut">
               <a:rPr lang="en-US" smtClean="0"/>
-              <a:t>7/20/2023</a:t>
+              <a:t>7/23/2023</a:t>
             </a:fld>
             <a:endParaRPr lang="en-US"/>
           </a:p>
@@ -4406,7 +4406,7 @@
           <a:p>
             <a:fld id="{EDD99DFF-4D7C-4671-8EF0-23A72D1484EC}" type="datetimeFigureOut">
               <a:rPr lang="en-US" smtClean="0"/>
-              <a:t>7/20/2023</a:t>
+              <a:t>7/23/2023</a:t>
             </a:fld>
             <a:endParaRPr lang="en-US"/>
           </a:p>
@@ -4821,7 +4821,7 @@
           <a:p>
             <a:fld id="{EDD99DFF-4D7C-4671-8EF0-23A72D1484EC}" type="datetimeFigureOut">
               <a:rPr lang="en-US" smtClean="0"/>
-              <a:t>7/20/2023</a:t>
+              <a:t>7/23/2023</a:t>
             </a:fld>
             <a:endParaRPr lang="en-US"/>
           </a:p>
@@ -4969,7 +4969,7 @@
           <a:p>
             <a:fld id="{EDD99DFF-4D7C-4671-8EF0-23A72D1484EC}" type="datetimeFigureOut">
               <a:rPr lang="en-US" smtClean="0"/>
-              <a:t>7/20/2023</a:t>
+              <a:t>7/23/2023</a:t>
             </a:fld>
             <a:endParaRPr lang="en-US"/>
           </a:p>
@@ -5094,7 +5094,7 @@
           <a:p>
             <a:fld id="{EDD99DFF-4D7C-4671-8EF0-23A72D1484EC}" type="datetimeFigureOut">
               <a:rPr lang="en-US" smtClean="0"/>
-              <a:t>7/20/2023</a:t>
+              <a:t>7/23/2023</a:t>
             </a:fld>
             <a:endParaRPr lang="en-US"/>
           </a:p>
@@ -5373,7 +5373,7 @@
           <a:p>
             <a:fld id="{EDD99DFF-4D7C-4671-8EF0-23A72D1484EC}" type="datetimeFigureOut">
               <a:rPr lang="en-US" smtClean="0"/>
-              <a:t>7/20/2023</a:t>
+              <a:t>7/23/2023</a:t>
             </a:fld>
             <a:endParaRPr lang="en-US"/>
           </a:p>
@@ -5685,7 +5685,7 @@
           <a:p>
             <a:fld id="{EDD99DFF-4D7C-4671-8EF0-23A72D1484EC}" type="datetimeFigureOut">
               <a:rPr lang="en-US" smtClean="0"/>
-              <a:t>7/20/2023</a:t>
+              <a:t>7/23/2023</a:t>
             </a:fld>
             <a:endParaRPr lang="en-US"/>
           </a:p>
@@ -5938,7 +5938,7 @@
           <a:p>
             <a:fld id="{EDD99DFF-4D7C-4671-8EF0-23A72D1484EC}" type="datetimeFigureOut">
               <a:rPr lang="en-US" smtClean="0"/>
-              <a:t>7/20/2023</a:t>
+              <a:t>7/23/2023</a:t>
             </a:fld>
             <a:endParaRPr lang="en-US"/>
           </a:p>
@@ -7499,7 +7499,7 @@
         <p:spPr>
           <a:xfrm>
             <a:off x="6191249" y="1149350"/>
-            <a:ext cx="5708963" cy="6001643"/>
+            <a:ext cx="5708963" cy="4893647"/>
           </a:xfrm>
           <a:prstGeom prst="rect">
             <a:avLst/>
@@ -7515,107 +7515,107 @@
           <a:lstStyle/>
           <a:p>
             <a:r>
-              <a:rPr lang="en-US" sz="1600" dirty="0"/>
+              <a:rPr lang="en-US" sz="1200" dirty="0"/>
               <a:t>(Delegated actions here as applicable)</a:t>
             </a:r>
           </a:p>
           <a:p>
             <a:r>
-              <a:rPr lang="en-US" sz="1600" dirty="0"/>
+              <a:rPr lang="en-US" sz="1200" strike="sngStrike" dirty="0"/>
               <a:t>- Ryan is doing web scraping of table data for county cases of West  Nile (</a:t>
             </a:r>
             <a:r>
-              <a:rPr lang="en-US" sz="1600" dirty="0" err="1"/>
+              <a:rPr lang="en-US" sz="1200" strike="sngStrike" dirty="0" err="1"/>
               <a:t>lymes</a:t>
             </a:r>
             <a:r>
-              <a:rPr lang="en-US" sz="1600" dirty="0"/>
+              <a:rPr lang="en-US" sz="1200" strike="sngStrike" dirty="0"/>
               <a:t>?). Make look similar to Lyme disease data.</a:t>
             </a:r>
           </a:p>
           <a:p>
             <a:r>
-              <a:rPr lang="en-US" sz="1600" dirty="0"/>
+              <a:rPr lang="en-US" sz="1200" strike="sngStrike" dirty="0"/>
               <a:t>	- So we’ll have all county data for West Nile and </a:t>
             </a:r>
             <a:r>
-              <a:rPr lang="en-US" sz="1600" dirty="0" err="1"/>
+              <a:rPr lang="en-US" sz="1200" strike="sngStrike" dirty="0" err="1"/>
               <a:t>Lymes</a:t>
             </a:r>
             <a:r>
-              <a:rPr lang="en-US" sz="1600" dirty="0"/>
-              <a:t> by 	county by year. Nice!</a:t>
-            </a:r>
-          </a:p>
-          <a:p>
-            <a:endParaRPr lang="en-US" sz="1600" dirty="0"/>
-          </a:p>
-          <a:p>
-            <a:r>
-              <a:rPr lang="en-US" sz="1600" dirty="0"/>
+              <a:rPr lang="en-US" sz="1200" strike="sngStrike" dirty="0"/>
+              <a:t> by 	county by year. </a:t>
+            </a:r>
+          </a:p>
+          <a:p>
+            <a:endParaRPr lang="en-US" sz="1200" dirty="0"/>
+          </a:p>
+          <a:p>
+            <a:r>
+              <a:rPr lang="en-US" sz="1200" strike="sngStrike" dirty="0"/>
               <a:t>- Ryan getting </a:t>
             </a:r>
             <a:r>
-              <a:rPr lang="en-US" sz="1600" dirty="0" err="1"/>
+              <a:rPr lang="en-US" sz="1200" strike="sngStrike" dirty="0" err="1"/>
               <a:t>GeoJSON</a:t>
             </a:r>
             <a:r>
-              <a:rPr lang="en-US" sz="1600" dirty="0"/>
+              <a:rPr lang="en-US" sz="1200" strike="sngStrike" dirty="0"/>
               <a:t> and adding to github.</a:t>
             </a:r>
           </a:p>
           <a:p>
             <a:r>
-              <a:rPr lang="en-US" sz="1600" dirty="0"/>
+              <a:rPr lang="en-US" sz="1200" strike="sngStrike" dirty="0"/>
               <a:t>	- Will also have county line maps for </a:t>
             </a:r>
             <a:r>
-              <a:rPr lang="en-US" sz="1600" dirty="0" err="1"/>
+              <a:rPr lang="en-US" sz="1200" strike="sngStrike" dirty="0" err="1"/>
               <a:t>GeoJSON</a:t>
             </a:r>
             <a:r>
-              <a:rPr lang="en-US" sz="1600" dirty="0"/>
+              <a:rPr lang="en-US" sz="1200" strike="sngStrike" dirty="0"/>
               <a:t>.</a:t>
             </a:r>
           </a:p>
           <a:p>
             <a:r>
-              <a:rPr lang="en-US" sz="1600" dirty="0"/>
+              <a:rPr lang="en-US" sz="1200" strike="sngStrike" dirty="0"/>
               <a:t>	- Scraping for West Nile and </a:t>
             </a:r>
             <a:r>
-              <a:rPr lang="en-US" sz="1600" dirty="0" err="1"/>
+              <a:rPr lang="en-US" sz="1200" strike="sngStrike" dirty="0" err="1"/>
               <a:t>and</a:t>
             </a:r>
             <a:r>
-              <a:rPr lang="en-US" sz="1600" dirty="0"/>
+              <a:rPr lang="en-US" sz="1200" strike="sngStrike" dirty="0"/>
               <a:t> </a:t>
             </a:r>
             <a:r>
-              <a:rPr lang="en-US" sz="1600" dirty="0" err="1"/>
+              <a:rPr lang="en-US" sz="1200" strike="sngStrike" dirty="0" err="1"/>
               <a:t>lyme</a:t>
             </a:r>
             <a:r>
-              <a:rPr lang="en-US" sz="1600" dirty="0"/>
+              <a:rPr lang="en-US" sz="1200" strike="sngStrike" dirty="0"/>
               <a:t> in-process.</a:t>
             </a:r>
           </a:p>
           <a:p>
             <a:r>
-              <a:rPr lang="en-US" sz="1600" dirty="0"/>
+              <a:rPr lang="en-US" sz="1200" strike="sngStrike" dirty="0"/>
               <a:t>	- </a:t>
             </a:r>
             <a:r>
-              <a:rPr lang="en-US" sz="1600" dirty="0" err="1"/>
+              <a:rPr lang="en-US" sz="1200" strike="sngStrike" dirty="0" err="1"/>
               <a:t>GeoJSON</a:t>
             </a:r>
             <a:r>
-              <a:rPr lang="en-US" sz="1600" dirty="0"/>
+              <a:rPr lang="en-US" sz="1200" strike="sngStrike" dirty="0"/>
               <a:t> in-process.</a:t>
             </a:r>
           </a:p>
           <a:p>
-            <a:endParaRPr lang="en-US" sz="1600" dirty="0"/>
+            <a:endParaRPr lang="en-US" sz="1200" dirty="0"/>
           </a:p>
           <a:p>
             <a:pPr marL="285750" indent="-285750">
@@ -7623,20 +7623,74 @@
               <a:buChar char="-"/>
             </a:pPr>
             <a:r>
-              <a:rPr lang="en-US" sz="1600" dirty="0"/>
+              <a:rPr lang="en-US" sz="1200" dirty="0"/>
               <a:t>Evan to build SQL tables for the West Nile and </a:t>
             </a:r>
             <a:r>
-              <a:rPr lang="en-US" sz="1600" dirty="0" err="1"/>
+              <a:rPr lang="en-US" sz="1200" dirty="0" err="1"/>
               <a:t>Lymes</a:t>
             </a:r>
             <a:r>
-              <a:rPr lang="en-US" sz="1600" dirty="0"/>
+              <a:rPr lang="en-US" sz="1200" dirty="0"/>
               <a:t> in PostgreSQL. </a:t>
             </a:r>
           </a:p>
           <a:p>
-            <a:endParaRPr lang="en-US" sz="1600" dirty="0"/>
+            <a:pPr marL="742950" lvl="1" indent="-285750">
+              <a:buFontTx/>
+              <a:buChar char="-"/>
+            </a:pPr>
+            <a:r>
+              <a:rPr lang="en-US" sz="1200" dirty="0"/>
+              <a:t>Include instructions in the README for all data scraping and database setup steps.</a:t>
+            </a:r>
+          </a:p>
+          <a:p>
+            <a:pPr marL="742950" lvl="1" indent="-285750">
+              <a:buFontTx/>
+              <a:buChar char="-"/>
+            </a:pPr>
+            <a:r>
+              <a:rPr lang="en-US" sz="1200" dirty="0"/>
+              <a:t>Consider bringing data scrape .</a:t>
+            </a:r>
+            <a:r>
+              <a:rPr lang="en-US" sz="1200" dirty="0" err="1"/>
+              <a:t>py</a:t>
+            </a:r>
+            <a:r>
+              <a:rPr lang="en-US" sz="1200" dirty="0"/>
+              <a:t> files into single python script to run all </a:t>
+            </a:r>
+            <a:r>
+              <a:rPr lang="en-US" sz="1200" dirty="0" err="1"/>
+              <a:t>en</a:t>
+            </a:r>
+            <a:r>
+              <a:rPr lang="en-US" sz="1200" dirty="0"/>
+              <a:t> masse. </a:t>
+            </a:r>
+          </a:p>
+          <a:p>
+            <a:pPr marL="1200150" lvl="2" indent="-285750">
+              <a:buFontTx/>
+              <a:buChar char="-"/>
+            </a:pPr>
+            <a:r>
+              <a:rPr lang="en-US" sz="1200" dirty="0"/>
+              <a:t>Add </a:t>
+            </a:r>
+            <a:r>
+              <a:rPr lang="en-US" sz="1200" dirty="0" err="1"/>
+              <a:t>python_to_postgres</a:t>
+            </a:r>
+            <a:r>
+              <a:rPr lang="en-US" sz="1200" dirty="0"/>
+              <a:t> function within data scrape.py files to export DataFrames to SQL with config file reference (retain the CSV export outputs in those data scrape.py files)</a:t>
+            </a:r>
+          </a:p>
+          <a:p>
+            <a:endParaRPr lang="en-US" sz="1200" dirty="0"/>
           </a:p>
           <a:p>
             <a:pPr marL="285750" indent="-285750">
@@ -7644,12 +7698,12 @@
               <a:buChar char="-"/>
             </a:pPr>
             <a:r>
-              <a:rPr lang="en-US" sz="1600" dirty="0"/>
-              <a:t>Kevin will research JavaScript library/plugin for the mapping visualization year slider.</a:t>
-            </a:r>
-          </a:p>
-          <a:p>
-            <a:endParaRPr lang="en-US" sz="1600" dirty="0"/>
+              <a:rPr lang="en-US" sz="1200" dirty="0"/>
+              <a:t>Kevin to research JavaScript library/plugin for the mapping visualization year slider.</a:t>
+            </a:r>
+          </a:p>
+          <a:p>
+            <a:endParaRPr lang="en-US" sz="1200" dirty="0"/>
           </a:p>
           <a:p>
             <a:pPr marL="285750" indent="-285750">
@@ -7657,7 +7711,7 @@
               <a:buChar char="-"/>
             </a:pPr>
             <a:r>
-              <a:rPr lang="en-US" sz="1600" dirty="0"/>
+              <a:rPr lang="en-US" sz="1200" strike="sngStrike" dirty="0"/>
               <a:t>Timothy to look into getting Temp data by county by year. Extract from NCEI site. Get into a bulk CSV for our year range of 2000 – 2020. Get avg monthly temp data for 3 months centered around August per county for year range.</a:t>
             </a:r>
           </a:p>
@@ -7667,18 +7721,18 @@
               <a:buChar char="-"/>
             </a:pPr>
             <a:r>
-              <a:rPr lang="en-US" sz="1600" dirty="0"/>
+              <a:rPr lang="en-US" sz="1200" strike="sngStrike" dirty="0"/>
               <a:t>Need to write to CSV and output to Resources folder.</a:t>
             </a:r>
           </a:p>
           <a:p>
-            <a:pPr marL="285750" indent="-285750">
+            <a:pPr marL="742950" lvl="1" indent="-285750">
               <a:buFontTx/>
               <a:buChar char="-"/>
             </a:pPr>
             <a:r>
-              <a:rPr lang="en-US" sz="1600" dirty="0"/>
-              <a:t>And get precipitation (total rainfall) for those same ranges. (should be quick)</a:t>
+              <a:rPr lang="en-US" sz="1200" strike="sngStrike" dirty="0"/>
+              <a:t>And get precipitation (total rainfall) for those same ranges.</a:t>
             </a:r>
           </a:p>
         </p:txBody>

</xml_diff>

<commit_message>
ERS: Adding postgreSQL setup file and instructions. Manually cleaned LD-Case-Counts-by-County-01-20.csv for data import issue.
</commit_message>
<xml_diff>
--- a/Project_3_outline.pptx
+++ b/Project_3_outline.pptx
@@ -7499,7 +7499,7 @@
         <p:spPr>
           <a:xfrm>
             <a:off x="6191249" y="1149350"/>
-            <a:ext cx="5708963" cy="4893647"/>
+            <a:ext cx="5708963" cy="5001369"/>
           </a:xfrm>
           <a:prstGeom prst="rect">
             <a:avLst/>
@@ -7515,107 +7515,81 @@
           <a:lstStyle/>
           <a:p>
             <a:r>
-              <a:rPr lang="en-US" sz="1200" dirty="0"/>
+              <a:rPr lang="en-US" sz="1100" dirty="0"/>
               <a:t>(Delegated actions here as applicable)</a:t>
             </a:r>
           </a:p>
           <a:p>
             <a:r>
-              <a:rPr lang="en-US" sz="1200" strike="sngStrike" dirty="0"/>
+              <a:rPr lang="en-US" sz="1100" strike="sngStrike" dirty="0"/>
               <a:t>- Ryan is doing web scraping of table data for county cases of West  Nile (</a:t>
             </a:r>
             <a:r>
-              <a:rPr lang="en-US" sz="1200" strike="sngStrike" dirty="0" err="1"/>
+              <a:rPr lang="en-US" sz="1100" strike="sngStrike" dirty="0" err="1"/>
               <a:t>lymes</a:t>
             </a:r>
             <a:r>
-              <a:rPr lang="en-US" sz="1200" strike="sngStrike" dirty="0"/>
+              <a:rPr lang="en-US" sz="1100" strike="sngStrike" dirty="0"/>
               <a:t>?). Make look similar to Lyme disease data.</a:t>
             </a:r>
           </a:p>
           <a:p>
             <a:r>
-              <a:rPr lang="en-US" sz="1200" strike="sngStrike" dirty="0"/>
-              <a:t>	- So we’ll have all county data for West Nile and </a:t>
-            </a:r>
-            <a:r>
-              <a:rPr lang="en-US" sz="1200" strike="sngStrike" dirty="0" err="1"/>
-              <a:t>Lymes</a:t>
-            </a:r>
-            <a:r>
-              <a:rPr lang="en-US" sz="1200" strike="sngStrike" dirty="0"/>
-              <a:t> by 	county by year. </a:t>
-            </a:r>
-          </a:p>
-          <a:p>
-            <a:endParaRPr lang="en-US" sz="1200" dirty="0"/>
-          </a:p>
-          <a:p>
-            <a:r>
-              <a:rPr lang="en-US" sz="1200" strike="sngStrike" dirty="0"/>
-              <a:t>- Ryan getting </a:t>
-            </a:r>
-            <a:r>
-              <a:rPr lang="en-US" sz="1200" strike="sngStrike" dirty="0" err="1"/>
-              <a:t>GeoJSON</a:t>
-            </a:r>
-            <a:r>
-              <a:rPr lang="en-US" sz="1200" strike="sngStrike" dirty="0"/>
-              <a:t> and adding to github.</a:t>
-            </a:r>
-          </a:p>
-          <a:p>
-            <a:r>
-              <a:rPr lang="en-US" sz="1200" strike="sngStrike" dirty="0"/>
-              <a:t>	- Will also have county line maps for </a:t>
-            </a:r>
-            <a:r>
-              <a:rPr lang="en-US" sz="1200" strike="sngStrike" dirty="0" err="1"/>
-              <a:t>GeoJSON</a:t>
-            </a:r>
-            <a:r>
-              <a:rPr lang="en-US" sz="1200" strike="sngStrike" dirty="0"/>
-              <a:t>.</a:t>
-            </a:r>
-          </a:p>
-          <a:p>
-            <a:r>
-              <a:rPr lang="en-US" sz="1200" strike="sngStrike" dirty="0"/>
-              <a:t>	- Scraping for West Nile and </a:t>
-            </a:r>
-            <a:r>
-              <a:rPr lang="en-US" sz="1200" strike="sngStrike" dirty="0" err="1"/>
-              <a:t>and</a:t>
-            </a:r>
-            <a:r>
-              <a:rPr lang="en-US" sz="1200" strike="sngStrike" dirty="0"/>
-              <a:t> </a:t>
-            </a:r>
-            <a:r>
-              <a:rPr lang="en-US" sz="1200" strike="sngStrike" dirty="0" err="1"/>
-              <a:t>lyme</a:t>
-            </a:r>
-            <a:r>
-              <a:rPr lang="en-US" sz="1200" strike="sngStrike" dirty="0"/>
-              <a:t> in-process.</a:t>
-            </a:r>
-          </a:p>
-          <a:p>
-            <a:r>
-              <a:rPr lang="en-US" sz="1200" strike="sngStrike" dirty="0"/>
-              <a:t>	- </a:t>
-            </a:r>
-            <a:r>
-              <a:rPr lang="en-US" sz="1200" strike="sngStrike" dirty="0" err="1"/>
-              <a:t>GeoJSON</a:t>
-            </a:r>
-            <a:r>
-              <a:rPr lang="en-US" sz="1200" strike="sngStrike" dirty="0"/>
-              <a:t> in-process.</a:t>
-            </a:r>
-          </a:p>
-          <a:p>
-            <a:endParaRPr lang="en-US" sz="1200" dirty="0"/>
+              <a:rPr lang="en-US" sz="1100" strike="sngStrike" dirty="0"/>
+              <a:t>	- So we’ll have all county data for West Nile and Lymes by 	county by year. </a:t>
+            </a:r>
+          </a:p>
+          <a:p>
+            <a:endParaRPr lang="en-US" sz="1100" dirty="0"/>
+          </a:p>
+          <a:p>
+            <a:r>
+              <a:rPr lang="en-US" sz="1100" strike="sngStrike" dirty="0"/>
+              <a:t>- Ryan getting GeoJSON and adding to github.</a:t>
+            </a:r>
+          </a:p>
+          <a:p>
+            <a:r>
+              <a:rPr lang="en-US" sz="1100" strike="sngStrike" dirty="0"/>
+              <a:t>	- Will also have county line maps for GeoJSON.</a:t>
+            </a:r>
+          </a:p>
+          <a:p>
+            <a:r>
+              <a:rPr lang="en-US" sz="1100" strike="sngStrike" dirty="0"/>
+              <a:t>	- Scraping for West Nile and lyme in-process.</a:t>
+            </a:r>
+          </a:p>
+          <a:p>
+            <a:r>
+              <a:rPr lang="en-US" sz="1100" strike="sngStrike" dirty="0"/>
+              <a:t>	- GeoJSON in-process.</a:t>
+            </a:r>
+          </a:p>
+          <a:p>
+            <a:r>
+              <a:rPr lang="en-US" sz="1100" dirty="0"/>
+              <a:t>	- ñ character of “Ne, Doña Ana County” stopping UTF-8 data import in SQL. Replace that one. Evan had some </a:t>
+            </a:r>
+            <a:r>
+              <a:rPr lang="en-US" sz="1100" dirty="0" err="1"/>
+              <a:t>noneType</a:t>
+            </a:r>
+            <a:r>
+              <a:rPr lang="en-US" sz="1100" dirty="0"/>
+              <a:t> issues with the container object in Ryan’s .</a:t>
+            </a:r>
+            <a:r>
+              <a:rPr lang="en-US" sz="1100" dirty="0" err="1"/>
+              <a:t>py</a:t>
+            </a:r>
+            <a:r>
+              <a:rPr lang="en-US" sz="1100" dirty="0"/>
+              <a:t> file.</a:t>
+            </a:r>
+          </a:p>
+          <a:p>
+            <a:endParaRPr lang="en-US" sz="1100" dirty="0"/>
           </a:p>
           <a:p>
             <a:pPr marL="285750" indent="-285750">
@@ -7623,16 +7597,12 @@
               <a:buChar char="-"/>
             </a:pPr>
             <a:r>
-              <a:rPr lang="en-US" sz="1200" dirty="0"/>
-              <a:t>Evan to build SQL tables for the West Nile and </a:t>
-            </a:r>
-            <a:r>
-              <a:rPr lang="en-US" sz="1200" dirty="0" err="1"/>
-              <a:t>Lymes</a:t>
-            </a:r>
-            <a:r>
-              <a:rPr lang="en-US" sz="1200" dirty="0"/>
-              <a:t> in PostgreSQL. </a:t>
+              <a:rPr lang="en-US" sz="1100" strike="sngStrike" dirty="0"/>
+              <a:t>Evan to build SQL tables for the West Nile and Lymes in PostgreSQL.</a:t>
+            </a:r>
+            <a:r>
+              <a:rPr lang="en-US" sz="1100" dirty="0"/>
+              <a:t> </a:t>
             </a:r>
           </a:p>
           <a:p>
@@ -7641,7 +7611,7 @@
               <a:buChar char="-"/>
             </a:pPr>
             <a:r>
-              <a:rPr lang="en-US" sz="1200" dirty="0"/>
+              <a:rPr lang="en-US" sz="1100" dirty="0"/>
               <a:t>Include instructions in the README for all data scraping and database setup steps.</a:t>
             </a:r>
           </a:p>
@@ -7651,23 +7621,23 @@
               <a:buChar char="-"/>
             </a:pPr>
             <a:r>
-              <a:rPr lang="en-US" sz="1200" dirty="0"/>
+              <a:rPr lang="en-US" sz="1100" dirty="0"/>
               <a:t>Consider bringing data scrape .</a:t>
             </a:r>
             <a:r>
-              <a:rPr lang="en-US" sz="1200" dirty="0" err="1"/>
+              <a:rPr lang="en-US" sz="1100" dirty="0" err="1"/>
               <a:t>py</a:t>
             </a:r>
             <a:r>
-              <a:rPr lang="en-US" sz="1200" dirty="0"/>
+              <a:rPr lang="en-US" sz="1100" dirty="0"/>
               <a:t> files into single python script to run all </a:t>
             </a:r>
             <a:r>
-              <a:rPr lang="en-US" sz="1200" dirty="0" err="1"/>
+              <a:rPr lang="en-US" sz="1100" dirty="0" err="1"/>
               <a:t>en</a:t>
             </a:r>
             <a:r>
-              <a:rPr lang="en-US" sz="1200" dirty="0"/>
+              <a:rPr lang="en-US" sz="1100" dirty="0"/>
               <a:t> masse. </a:t>
             </a:r>
           </a:p>
@@ -7677,20 +7647,46 @@
               <a:buChar char="-"/>
             </a:pPr>
             <a:r>
-              <a:rPr lang="en-US" sz="1200" dirty="0"/>
+              <a:rPr lang="en-US" sz="1100" strike="sngStrike" dirty="0"/>
               <a:t>Add </a:t>
             </a:r>
             <a:r>
-              <a:rPr lang="en-US" sz="1200" dirty="0" err="1"/>
+              <a:rPr lang="en-US" sz="1100" strike="sngStrike" dirty="0" err="1"/>
               <a:t>python_to_postgres</a:t>
             </a:r>
             <a:r>
-              <a:rPr lang="en-US" sz="1200" dirty="0"/>
+              <a:rPr lang="en-US" sz="1100" strike="sngStrike" dirty="0"/>
               <a:t> function within data scrape.py files to export DataFrames to SQL with config file reference (retain the CSV export outputs in those data scrape.py files)</a:t>
             </a:r>
           </a:p>
           <a:p>
-            <a:endParaRPr lang="en-US" sz="1200" dirty="0"/>
+            <a:pPr marL="1657350" lvl="3" indent="-285750">
+              <a:buFontTx/>
+              <a:buChar char="-"/>
+            </a:pPr>
+            <a:r>
+              <a:rPr lang="en-US" sz="1100" dirty="0"/>
+              <a:t>Your .</a:t>
+            </a:r>
+            <a:r>
+              <a:rPr lang="en-US" sz="1100" dirty="0" err="1"/>
+              <a:t>sql</a:t>
+            </a:r>
+            <a:r>
+              <a:rPr lang="en-US" sz="1100" dirty="0"/>
+              <a:t> file would have to alter the imported tables instead of creating them… A little less manual for end users, but probs not worth updating the .</a:t>
+            </a:r>
+            <a:r>
+              <a:rPr lang="en-US" sz="1100" dirty="0" err="1"/>
+              <a:t>sql</a:t>
+            </a:r>
+            <a:r>
+              <a:rPr lang="en-US" sz="1100" dirty="0"/>
+              <a:t> for this project.</a:t>
+            </a:r>
+          </a:p>
+          <a:p>
+            <a:endParaRPr lang="en-US" sz="1100" dirty="0"/>
           </a:p>
           <a:p>
             <a:pPr marL="285750" indent="-285750">
@@ -7698,12 +7694,12 @@
               <a:buChar char="-"/>
             </a:pPr>
             <a:r>
-              <a:rPr lang="en-US" sz="1200" dirty="0"/>
+              <a:rPr lang="en-US" sz="1100" dirty="0"/>
               <a:t>Kevin to research JavaScript library/plugin for the mapping visualization year slider.</a:t>
             </a:r>
           </a:p>
           <a:p>
-            <a:endParaRPr lang="en-US" sz="1200" dirty="0"/>
+            <a:endParaRPr lang="en-US" sz="1100" dirty="0"/>
           </a:p>
           <a:p>
             <a:pPr marL="285750" indent="-285750">
@@ -7711,7 +7707,7 @@
               <a:buChar char="-"/>
             </a:pPr>
             <a:r>
-              <a:rPr lang="en-US" sz="1200" strike="sngStrike" dirty="0"/>
+              <a:rPr lang="en-US" sz="1100" strike="sngStrike" dirty="0"/>
               <a:t>Timothy to look into getting Temp data by county by year. Extract from NCEI site. Get into a bulk CSV for our year range of 2000 – 2020. Get avg monthly temp data for 3 months centered around August per county for year range.</a:t>
             </a:r>
           </a:p>
@@ -7721,7 +7717,7 @@
               <a:buChar char="-"/>
             </a:pPr>
             <a:r>
-              <a:rPr lang="en-US" sz="1200" strike="sngStrike" dirty="0"/>
+              <a:rPr lang="en-US" sz="1100" strike="sngStrike" dirty="0"/>
               <a:t>Need to write to CSV and output to Resources folder.</a:t>
             </a:r>
           </a:p>
@@ -7731,7 +7727,7 @@
               <a:buChar char="-"/>
             </a:pPr>
             <a:r>
-              <a:rPr lang="en-US" sz="1200" strike="sngStrike" dirty="0"/>
+              <a:rPr lang="en-US" sz="1100" strike="sngStrike" dirty="0"/>
               <a:t>And get precipitation (total rainfall) for those same ranges.</a:t>
             </a:r>
           </a:p>

</xml_diff>

<commit_message>
Revert "ERS: Adding postgreSQL setup file and instructions. Manually cleaned LD-Case-Counts-by-County-01-20.csv for data import issue."
This reverts commit b67f202898ac577f96f6cd9c66b34b1b9f57814a.

ERS: Revert last push.
</commit_message>
<xml_diff>
--- a/Project_3_outline.pptx
+++ b/Project_3_outline.pptx
@@ -7499,7 +7499,7 @@
         <p:spPr>
           <a:xfrm>
             <a:off x="6191249" y="1149350"/>
-            <a:ext cx="5708963" cy="5001369"/>
+            <a:ext cx="5708963" cy="4893647"/>
           </a:xfrm>
           <a:prstGeom prst="rect">
             <a:avLst/>
@@ -7515,81 +7515,107 @@
           <a:lstStyle/>
           <a:p>
             <a:r>
-              <a:rPr lang="en-US" sz="1100" dirty="0"/>
+              <a:rPr lang="en-US" sz="1200" dirty="0"/>
               <a:t>(Delegated actions here as applicable)</a:t>
             </a:r>
           </a:p>
           <a:p>
             <a:r>
-              <a:rPr lang="en-US" sz="1100" strike="sngStrike" dirty="0"/>
+              <a:rPr lang="en-US" sz="1200" strike="sngStrike" dirty="0"/>
               <a:t>- Ryan is doing web scraping of table data for county cases of West  Nile (</a:t>
             </a:r>
             <a:r>
-              <a:rPr lang="en-US" sz="1100" strike="sngStrike" dirty="0" err="1"/>
+              <a:rPr lang="en-US" sz="1200" strike="sngStrike" dirty="0" err="1"/>
               <a:t>lymes</a:t>
             </a:r>
             <a:r>
-              <a:rPr lang="en-US" sz="1100" strike="sngStrike" dirty="0"/>
+              <a:rPr lang="en-US" sz="1200" strike="sngStrike" dirty="0"/>
               <a:t>?). Make look similar to Lyme disease data.</a:t>
             </a:r>
           </a:p>
           <a:p>
             <a:r>
-              <a:rPr lang="en-US" sz="1100" strike="sngStrike" dirty="0"/>
-              <a:t>	- So we’ll have all county data for West Nile and Lymes by 	county by year. </a:t>
-            </a:r>
-          </a:p>
-          <a:p>
-            <a:endParaRPr lang="en-US" sz="1100" dirty="0"/>
-          </a:p>
-          <a:p>
-            <a:r>
-              <a:rPr lang="en-US" sz="1100" strike="sngStrike" dirty="0"/>
-              <a:t>- Ryan getting GeoJSON and adding to github.</a:t>
-            </a:r>
-          </a:p>
-          <a:p>
-            <a:r>
-              <a:rPr lang="en-US" sz="1100" strike="sngStrike" dirty="0"/>
-              <a:t>	- Will also have county line maps for GeoJSON.</a:t>
-            </a:r>
-          </a:p>
-          <a:p>
-            <a:r>
-              <a:rPr lang="en-US" sz="1100" strike="sngStrike" dirty="0"/>
-              <a:t>	- Scraping for West Nile and lyme in-process.</a:t>
-            </a:r>
-          </a:p>
-          <a:p>
-            <a:r>
-              <a:rPr lang="en-US" sz="1100" strike="sngStrike" dirty="0"/>
-              <a:t>	- GeoJSON in-process.</a:t>
-            </a:r>
-          </a:p>
-          <a:p>
-            <a:r>
-              <a:rPr lang="en-US" sz="1100" dirty="0"/>
-              <a:t>	- ñ character of “Ne, Doña Ana County” stopping UTF-8 data import in SQL. Replace that one. Evan had some </a:t>
-            </a:r>
-            <a:r>
-              <a:rPr lang="en-US" sz="1100" dirty="0" err="1"/>
-              <a:t>noneType</a:t>
-            </a:r>
-            <a:r>
-              <a:rPr lang="en-US" sz="1100" dirty="0"/>
-              <a:t> issues with the container object in Ryan’s .</a:t>
-            </a:r>
-            <a:r>
-              <a:rPr lang="en-US" sz="1100" dirty="0" err="1"/>
-              <a:t>py</a:t>
-            </a:r>
-            <a:r>
-              <a:rPr lang="en-US" sz="1100" dirty="0"/>
-              <a:t> file.</a:t>
-            </a:r>
-          </a:p>
-          <a:p>
-            <a:endParaRPr lang="en-US" sz="1100" dirty="0"/>
+              <a:rPr lang="en-US" sz="1200" strike="sngStrike" dirty="0"/>
+              <a:t>	- So we’ll have all county data for West Nile and </a:t>
+            </a:r>
+            <a:r>
+              <a:rPr lang="en-US" sz="1200" strike="sngStrike" dirty="0" err="1"/>
+              <a:t>Lymes</a:t>
+            </a:r>
+            <a:r>
+              <a:rPr lang="en-US" sz="1200" strike="sngStrike" dirty="0"/>
+              <a:t> by 	county by year. </a:t>
+            </a:r>
+          </a:p>
+          <a:p>
+            <a:endParaRPr lang="en-US" sz="1200" dirty="0"/>
+          </a:p>
+          <a:p>
+            <a:r>
+              <a:rPr lang="en-US" sz="1200" strike="sngStrike" dirty="0"/>
+              <a:t>- Ryan getting </a:t>
+            </a:r>
+            <a:r>
+              <a:rPr lang="en-US" sz="1200" strike="sngStrike" dirty="0" err="1"/>
+              <a:t>GeoJSON</a:t>
+            </a:r>
+            <a:r>
+              <a:rPr lang="en-US" sz="1200" strike="sngStrike" dirty="0"/>
+              <a:t> and adding to github.</a:t>
+            </a:r>
+          </a:p>
+          <a:p>
+            <a:r>
+              <a:rPr lang="en-US" sz="1200" strike="sngStrike" dirty="0"/>
+              <a:t>	- Will also have county line maps for </a:t>
+            </a:r>
+            <a:r>
+              <a:rPr lang="en-US" sz="1200" strike="sngStrike" dirty="0" err="1"/>
+              <a:t>GeoJSON</a:t>
+            </a:r>
+            <a:r>
+              <a:rPr lang="en-US" sz="1200" strike="sngStrike" dirty="0"/>
+              <a:t>.</a:t>
+            </a:r>
+          </a:p>
+          <a:p>
+            <a:r>
+              <a:rPr lang="en-US" sz="1200" strike="sngStrike" dirty="0"/>
+              <a:t>	- Scraping for West Nile and </a:t>
+            </a:r>
+            <a:r>
+              <a:rPr lang="en-US" sz="1200" strike="sngStrike" dirty="0" err="1"/>
+              <a:t>and</a:t>
+            </a:r>
+            <a:r>
+              <a:rPr lang="en-US" sz="1200" strike="sngStrike" dirty="0"/>
+              <a:t> </a:t>
+            </a:r>
+            <a:r>
+              <a:rPr lang="en-US" sz="1200" strike="sngStrike" dirty="0" err="1"/>
+              <a:t>lyme</a:t>
+            </a:r>
+            <a:r>
+              <a:rPr lang="en-US" sz="1200" strike="sngStrike" dirty="0"/>
+              <a:t> in-process.</a:t>
+            </a:r>
+          </a:p>
+          <a:p>
+            <a:r>
+              <a:rPr lang="en-US" sz="1200" strike="sngStrike" dirty="0"/>
+              <a:t>	- </a:t>
+            </a:r>
+            <a:r>
+              <a:rPr lang="en-US" sz="1200" strike="sngStrike" dirty="0" err="1"/>
+              <a:t>GeoJSON</a:t>
+            </a:r>
+            <a:r>
+              <a:rPr lang="en-US" sz="1200" strike="sngStrike" dirty="0"/>
+              <a:t> in-process.</a:t>
+            </a:r>
+          </a:p>
+          <a:p>
+            <a:endParaRPr lang="en-US" sz="1200" dirty="0"/>
           </a:p>
           <a:p>
             <a:pPr marL="285750" indent="-285750">
@@ -7597,12 +7623,16 @@
               <a:buChar char="-"/>
             </a:pPr>
             <a:r>
-              <a:rPr lang="en-US" sz="1100" strike="sngStrike" dirty="0"/>
-              <a:t>Evan to build SQL tables for the West Nile and Lymes in PostgreSQL.</a:t>
-            </a:r>
-            <a:r>
-              <a:rPr lang="en-US" sz="1100" dirty="0"/>
-              <a:t> </a:t>
+              <a:rPr lang="en-US" sz="1200" dirty="0"/>
+              <a:t>Evan to build SQL tables for the West Nile and </a:t>
+            </a:r>
+            <a:r>
+              <a:rPr lang="en-US" sz="1200" dirty="0" err="1"/>
+              <a:t>Lymes</a:t>
+            </a:r>
+            <a:r>
+              <a:rPr lang="en-US" sz="1200" dirty="0"/>
+              <a:t> in PostgreSQL. </a:t>
             </a:r>
           </a:p>
           <a:p>
@@ -7611,7 +7641,7 @@
               <a:buChar char="-"/>
             </a:pPr>
             <a:r>
-              <a:rPr lang="en-US" sz="1100" dirty="0"/>
+              <a:rPr lang="en-US" sz="1200" dirty="0"/>
               <a:t>Include instructions in the README for all data scraping and database setup steps.</a:t>
             </a:r>
           </a:p>
@@ -7621,23 +7651,23 @@
               <a:buChar char="-"/>
             </a:pPr>
             <a:r>
-              <a:rPr lang="en-US" sz="1100" dirty="0"/>
+              <a:rPr lang="en-US" sz="1200" dirty="0"/>
               <a:t>Consider bringing data scrape .</a:t>
             </a:r>
             <a:r>
-              <a:rPr lang="en-US" sz="1100" dirty="0" err="1"/>
+              <a:rPr lang="en-US" sz="1200" dirty="0" err="1"/>
               <a:t>py</a:t>
             </a:r>
             <a:r>
-              <a:rPr lang="en-US" sz="1100" dirty="0"/>
+              <a:rPr lang="en-US" sz="1200" dirty="0"/>
               <a:t> files into single python script to run all </a:t>
             </a:r>
             <a:r>
-              <a:rPr lang="en-US" sz="1100" dirty="0" err="1"/>
+              <a:rPr lang="en-US" sz="1200" dirty="0" err="1"/>
               <a:t>en</a:t>
             </a:r>
             <a:r>
-              <a:rPr lang="en-US" sz="1100" dirty="0"/>
+              <a:rPr lang="en-US" sz="1200" dirty="0"/>
               <a:t> masse. </a:t>
             </a:r>
           </a:p>
@@ -7647,46 +7677,20 @@
               <a:buChar char="-"/>
             </a:pPr>
             <a:r>
-              <a:rPr lang="en-US" sz="1100" strike="sngStrike" dirty="0"/>
+              <a:rPr lang="en-US" sz="1200" dirty="0"/>
               <a:t>Add </a:t>
             </a:r>
             <a:r>
-              <a:rPr lang="en-US" sz="1100" strike="sngStrike" dirty="0" err="1"/>
+              <a:rPr lang="en-US" sz="1200" dirty="0" err="1"/>
               <a:t>python_to_postgres</a:t>
             </a:r>
             <a:r>
-              <a:rPr lang="en-US" sz="1100" strike="sngStrike" dirty="0"/>
+              <a:rPr lang="en-US" sz="1200" dirty="0"/>
               <a:t> function within data scrape.py files to export DataFrames to SQL with config file reference (retain the CSV export outputs in those data scrape.py files)</a:t>
             </a:r>
           </a:p>
           <a:p>
-            <a:pPr marL="1657350" lvl="3" indent="-285750">
-              <a:buFontTx/>
-              <a:buChar char="-"/>
-            </a:pPr>
-            <a:r>
-              <a:rPr lang="en-US" sz="1100" dirty="0"/>
-              <a:t>Your .</a:t>
-            </a:r>
-            <a:r>
-              <a:rPr lang="en-US" sz="1100" dirty="0" err="1"/>
-              <a:t>sql</a:t>
-            </a:r>
-            <a:r>
-              <a:rPr lang="en-US" sz="1100" dirty="0"/>
-              <a:t> file would have to alter the imported tables instead of creating them… A little less manual for end users, but probs not worth updating the .</a:t>
-            </a:r>
-            <a:r>
-              <a:rPr lang="en-US" sz="1100" dirty="0" err="1"/>
-              <a:t>sql</a:t>
-            </a:r>
-            <a:r>
-              <a:rPr lang="en-US" sz="1100" dirty="0"/>
-              <a:t> for this project.</a:t>
-            </a:r>
-          </a:p>
-          <a:p>
-            <a:endParaRPr lang="en-US" sz="1100" dirty="0"/>
+            <a:endParaRPr lang="en-US" sz="1200" dirty="0"/>
           </a:p>
           <a:p>
             <a:pPr marL="285750" indent="-285750">
@@ -7694,12 +7698,12 @@
               <a:buChar char="-"/>
             </a:pPr>
             <a:r>
-              <a:rPr lang="en-US" sz="1100" dirty="0"/>
+              <a:rPr lang="en-US" sz="1200" dirty="0"/>
               <a:t>Kevin to research JavaScript library/plugin for the mapping visualization year slider.</a:t>
             </a:r>
           </a:p>
           <a:p>
-            <a:endParaRPr lang="en-US" sz="1100" dirty="0"/>
+            <a:endParaRPr lang="en-US" sz="1200" dirty="0"/>
           </a:p>
           <a:p>
             <a:pPr marL="285750" indent="-285750">
@@ -7707,7 +7711,7 @@
               <a:buChar char="-"/>
             </a:pPr>
             <a:r>
-              <a:rPr lang="en-US" sz="1100" strike="sngStrike" dirty="0"/>
+              <a:rPr lang="en-US" sz="1200" strike="sngStrike" dirty="0"/>
               <a:t>Timothy to look into getting Temp data by county by year. Extract from NCEI site. Get into a bulk CSV for our year range of 2000 – 2020. Get avg monthly temp data for 3 months centered around August per county for year range.</a:t>
             </a:r>
           </a:p>
@@ -7717,7 +7721,7 @@
               <a:buChar char="-"/>
             </a:pPr>
             <a:r>
-              <a:rPr lang="en-US" sz="1100" strike="sngStrike" dirty="0"/>
+              <a:rPr lang="en-US" sz="1200" strike="sngStrike" dirty="0"/>
               <a:t>Need to write to CSV and output to Resources folder.</a:t>
             </a:r>
           </a:p>
@@ -7727,7 +7731,7 @@
               <a:buChar char="-"/>
             </a:pPr>
             <a:r>
-              <a:rPr lang="en-US" sz="1100" strike="sngStrike" dirty="0"/>
+              <a:rPr lang="en-US" sz="1200" strike="sngStrike" dirty="0"/>
               <a:t>And get precipitation (total rainfall) for those same ranges.</a:t>
             </a:r>
           </a:p>

</xml_diff>

<commit_message>
ERS: Adding postgreSQL files: .sql for table setup and instructions README.
</commit_message>
<xml_diff>
--- a/Project_3_outline.pptx
+++ b/Project_3_outline.pptx
@@ -358,7 +358,7 @@
           <a:p>
             <a:fld id="{EDD99DFF-4D7C-4671-8EF0-23A72D1484EC}" type="datetimeFigureOut">
               <a:rPr lang="en-US" smtClean="0"/>
-              <a:t>7/23/2023</a:t>
+              <a:t>7/24/2023</a:t>
             </a:fld>
             <a:endParaRPr lang="en-US"/>
           </a:p>
@@ -670,7 +670,7 @@
           <a:p>
             <a:fld id="{EDD99DFF-4D7C-4671-8EF0-23A72D1484EC}" type="datetimeFigureOut">
               <a:rPr lang="en-US" smtClean="0"/>
-              <a:t>7/23/2023</a:t>
+              <a:t>7/24/2023</a:t>
             </a:fld>
             <a:endParaRPr lang="en-US"/>
           </a:p>
@@ -892,7 +892,7 @@
           <a:p>
             <a:fld id="{EDD99DFF-4D7C-4671-8EF0-23A72D1484EC}" type="datetimeFigureOut">
               <a:rPr lang="en-US" smtClean="0"/>
-              <a:t>7/23/2023</a:t>
+              <a:t>7/24/2023</a:t>
             </a:fld>
             <a:endParaRPr lang="en-US"/>
           </a:p>
@@ -1183,7 +1183,7 @@
           <a:p>
             <a:fld id="{EDD99DFF-4D7C-4671-8EF0-23A72D1484EC}" type="datetimeFigureOut">
               <a:rPr lang="en-US" smtClean="0"/>
-              <a:t>7/23/2023</a:t>
+              <a:t>7/24/2023</a:t>
             </a:fld>
             <a:endParaRPr lang="en-US"/>
           </a:p>
@@ -1637,7 +1637,7 @@
           <a:p>
             <a:fld id="{EDD99DFF-4D7C-4671-8EF0-23A72D1484EC}" type="datetimeFigureOut">
               <a:rPr lang="en-US" smtClean="0"/>
-              <a:t>7/23/2023</a:t>
+              <a:t>7/24/2023</a:t>
             </a:fld>
             <a:endParaRPr lang="en-US"/>
           </a:p>
@@ -2213,7 +2213,7 @@
           <a:p>
             <a:fld id="{EDD99DFF-4D7C-4671-8EF0-23A72D1484EC}" type="datetimeFigureOut">
               <a:rPr lang="en-US" smtClean="0"/>
-              <a:t>7/23/2023</a:t>
+              <a:t>7/24/2023</a:t>
             </a:fld>
             <a:endParaRPr lang="en-US"/>
           </a:p>
@@ -3065,7 +3065,7 @@
           <a:p>
             <a:fld id="{EDD99DFF-4D7C-4671-8EF0-23A72D1484EC}" type="datetimeFigureOut">
               <a:rPr lang="en-US" smtClean="0"/>
-              <a:t>7/23/2023</a:t>
+              <a:t>7/24/2023</a:t>
             </a:fld>
             <a:endParaRPr lang="en-US"/>
           </a:p>
@@ -3270,7 +3270,7 @@
           <a:p>
             <a:fld id="{EDD99DFF-4D7C-4671-8EF0-23A72D1484EC}" type="datetimeFigureOut">
               <a:rPr lang="en-US" smtClean="0"/>
-              <a:t>7/23/2023</a:t>
+              <a:t>7/24/2023</a:t>
             </a:fld>
             <a:endParaRPr lang="en-US"/>
           </a:p>
@@ -3484,7 +3484,7 @@
           <a:p>
             <a:fld id="{EDD99DFF-4D7C-4671-8EF0-23A72D1484EC}" type="datetimeFigureOut">
               <a:rPr lang="en-US" smtClean="0"/>
-              <a:t>7/23/2023</a:t>
+              <a:t>7/24/2023</a:t>
             </a:fld>
             <a:endParaRPr lang="en-US"/>
           </a:p>
@@ -3654,7 +3654,7 @@
           <a:p>
             <a:fld id="{EDD99DFF-4D7C-4671-8EF0-23A72D1484EC}" type="datetimeFigureOut">
               <a:rPr lang="en-US" smtClean="0"/>
-              <a:t>7/23/2023</a:t>
+              <a:t>7/24/2023</a:t>
             </a:fld>
             <a:endParaRPr lang="en-US"/>
           </a:p>
@@ -3859,7 +3859,7 @@
           <a:p>
             <a:fld id="{EDD99DFF-4D7C-4671-8EF0-23A72D1484EC}" type="datetimeFigureOut">
               <a:rPr lang="en-US" smtClean="0"/>
-              <a:t>7/23/2023</a:t>
+              <a:t>7/24/2023</a:t>
             </a:fld>
             <a:endParaRPr lang="en-US"/>
           </a:p>
@@ -4139,7 +4139,7 @@
           <a:p>
             <a:fld id="{EDD99DFF-4D7C-4671-8EF0-23A72D1484EC}" type="datetimeFigureOut">
               <a:rPr lang="en-US" smtClean="0"/>
-              <a:t>7/23/2023</a:t>
+              <a:t>7/24/2023</a:t>
             </a:fld>
             <a:endParaRPr lang="en-US"/>
           </a:p>
@@ -4406,7 +4406,7 @@
           <a:p>
             <a:fld id="{EDD99DFF-4D7C-4671-8EF0-23A72D1484EC}" type="datetimeFigureOut">
               <a:rPr lang="en-US" smtClean="0"/>
-              <a:t>7/23/2023</a:t>
+              <a:t>7/24/2023</a:t>
             </a:fld>
             <a:endParaRPr lang="en-US"/>
           </a:p>
@@ -4821,7 +4821,7 @@
           <a:p>
             <a:fld id="{EDD99DFF-4D7C-4671-8EF0-23A72D1484EC}" type="datetimeFigureOut">
               <a:rPr lang="en-US" smtClean="0"/>
-              <a:t>7/23/2023</a:t>
+              <a:t>7/24/2023</a:t>
             </a:fld>
             <a:endParaRPr lang="en-US"/>
           </a:p>
@@ -4969,7 +4969,7 @@
           <a:p>
             <a:fld id="{EDD99DFF-4D7C-4671-8EF0-23A72D1484EC}" type="datetimeFigureOut">
               <a:rPr lang="en-US" smtClean="0"/>
-              <a:t>7/23/2023</a:t>
+              <a:t>7/24/2023</a:t>
             </a:fld>
             <a:endParaRPr lang="en-US"/>
           </a:p>
@@ -5094,7 +5094,7 @@
           <a:p>
             <a:fld id="{EDD99DFF-4D7C-4671-8EF0-23A72D1484EC}" type="datetimeFigureOut">
               <a:rPr lang="en-US" smtClean="0"/>
-              <a:t>7/23/2023</a:t>
+              <a:t>7/24/2023</a:t>
             </a:fld>
             <a:endParaRPr lang="en-US"/>
           </a:p>
@@ -5373,7 +5373,7 @@
           <a:p>
             <a:fld id="{EDD99DFF-4D7C-4671-8EF0-23A72D1484EC}" type="datetimeFigureOut">
               <a:rPr lang="en-US" smtClean="0"/>
-              <a:t>7/23/2023</a:t>
+              <a:t>7/24/2023</a:t>
             </a:fld>
             <a:endParaRPr lang="en-US"/>
           </a:p>
@@ -5685,7 +5685,7 @@
           <a:p>
             <a:fld id="{EDD99DFF-4D7C-4671-8EF0-23A72D1484EC}" type="datetimeFigureOut">
               <a:rPr lang="en-US" smtClean="0"/>
-              <a:t>7/23/2023</a:t>
+              <a:t>7/24/2023</a:t>
             </a:fld>
             <a:endParaRPr lang="en-US"/>
           </a:p>
@@ -5938,7 +5938,7 @@
           <a:p>
             <a:fld id="{EDD99DFF-4D7C-4671-8EF0-23A72D1484EC}" type="datetimeFigureOut">
               <a:rPr lang="en-US" smtClean="0"/>
-              <a:t>7/23/2023</a:t>
+              <a:t>7/24/2023</a:t>
             </a:fld>
             <a:endParaRPr lang="en-US"/>
           </a:p>
@@ -8021,7 +8021,7 @@
         <p:spPr>
           <a:xfrm>
             <a:off x="6191250" y="2131033"/>
-            <a:ext cx="5708963" cy="3970318"/>
+            <a:ext cx="5708963" cy="4862870"/>
           </a:xfrm>
           <a:prstGeom prst="rect">
             <a:avLst/>
@@ -8037,7 +8037,7 @@
           <a:lstStyle/>
           <a:p>
             <a:r>
-              <a:rPr lang="en-US" dirty="0"/>
+              <a:rPr lang="en-US" sz="1600" dirty="0"/>
               <a:t>(Delegated actions here as applicable)</a:t>
             </a:r>
           </a:p>
@@ -8047,20 +8047,52 @@
               <a:buChar char="-"/>
             </a:pPr>
             <a:r>
-              <a:rPr lang="en-US" dirty="0"/>
+              <a:rPr lang="en-US" sz="1600" dirty="0"/>
               <a:t>Kevin to look into slider as a new </a:t>
             </a:r>
             <a:r>
-              <a:rPr lang="en-US" dirty="0" err="1"/>
+              <a:rPr lang="en-US" sz="1600" dirty="0" err="1"/>
               <a:t>Javascript</a:t>
             </a:r>
             <a:r>
-              <a:rPr lang="en-US" dirty="0"/>
+              <a:rPr lang="en-US" sz="1600" dirty="0"/>
               <a:t> library.</a:t>
             </a:r>
           </a:p>
           <a:p>
-            <a:endParaRPr lang="en-US" dirty="0"/>
+            <a:endParaRPr lang="en-US" sz="1600" dirty="0"/>
+          </a:p>
+          <a:p>
+            <a:r>
+              <a:rPr lang="en-US" sz="1600" dirty="0"/>
+              <a:t>Check out </a:t>
+            </a:r>
+            <a:r>
+              <a:rPr lang="en-US" sz="1600" dirty="0">
+                <a:hlinkClick r:id="rId7"/>
+              </a:rPr>
+              <a:t>https://www.chartjs.org/</a:t>
+            </a:r>
+            <a:r>
+              <a:rPr lang="en-US" sz="1600" dirty="0"/>
+              <a:t> or </a:t>
+            </a:r>
+            <a:r>
+              <a:rPr lang="en-US" sz="1600" dirty="0">
+                <a:hlinkClick r:id="rId8"/>
+              </a:rPr>
+              <a:t>https://www.apexcharts.com/</a:t>
+            </a:r>
+            <a:r>
+              <a:rPr lang="en-US" sz="1600" dirty="0"/>
+              <a:t> for library not used in class. </a:t>
+            </a:r>
+          </a:p>
+          <a:p>
+            <a:r>
+              <a:rPr lang="en-US" sz="1600" dirty="0"/>
+              <a:t>	- Use for pareto of illnesses visual: averaged across all years 	or counties?</a:t>
+            </a:r>
           </a:p>
           <a:p>
             <a:endParaRPr lang="en-US" dirty="0"/>
@@ -8120,7 +8152,7 @@
                 <p:nvPr/>
               </p:nvPicPr>
               <p:blipFill>
-                <a:blip r:embed="rId7"/>
+                <a:blip r:embed="rId9"/>
                 <a:stretch>
                   <a:fillRect/>
                 </a:stretch>
@@ -8159,7 +8191,7 @@
                 <p:nvPr/>
               </p:nvPicPr>
               <p:blipFill>
-                <a:blip r:embed="rId8"/>
+                <a:blip r:embed="rId10"/>
                 <a:stretch>
                   <a:fillRect/>
                 </a:stretch>
@@ -8198,7 +8230,7 @@
                 <p:nvPr/>
               </p:nvPicPr>
               <p:blipFill>
-                <a:blip r:embed="rId9"/>
+                <a:blip r:embed="rId11"/>
                 <a:stretch>
                   <a:fillRect/>
                 </a:stretch>
@@ -8237,7 +8269,7 @@
                 <p:nvPr/>
               </p:nvPicPr>
               <p:blipFill>
-                <a:blip r:embed="rId10"/>
+                <a:blip r:embed="rId12"/>
                 <a:stretch>
                   <a:fillRect/>
                 </a:stretch>
@@ -8276,7 +8308,7 @@
                 <p:nvPr/>
               </p:nvPicPr>
               <p:blipFill>
-                <a:blip r:embed="rId11"/>
+                <a:blip r:embed="rId13"/>
                 <a:stretch>
                   <a:fillRect/>
                 </a:stretch>

</xml_diff>

<commit_message>
ERS: Started Flask API file. Updated outline.
</commit_message>
<xml_diff>
--- a/Project_3_outline.pptx
+++ b/Project_3_outline.pptx
@@ -7306,8 +7306,18 @@
                 <a:effectLst/>
                 <a:latin typeface="Slack-Lato"/>
               </a:rPr>
-              <a:t>ETL to pull your data in, clean it up, and send it off to your database.</a:t>
-            </a:r>
+              <a:t>ETL to pull your data in, clean it up, and send it off to your database. </a:t>
+            </a:r>
+            <a:r>
+              <a:rPr lang="en-US" cap="none" dirty="0">
+                <a:latin typeface="Slack-Lato"/>
+              </a:rPr>
+              <a:t>(DONE)</a:t>
+            </a:r>
+            <a:endParaRPr lang="en-US" b="0" i="0" cap="none" dirty="0">
+              <a:effectLst/>
+              <a:latin typeface="Slack-Lato"/>
+            </a:endParaRPr>
           </a:p>
           <a:p>
             <a:pPr lvl="1">
@@ -7319,8 +7329,35 @@
                 <a:effectLst/>
                 <a:latin typeface="Slack-Lato"/>
               </a:rPr>
-              <a:t>Flask API to interact with your database.</a:t>
-            </a:r>
+              <a:t>Flask API to interact with your database. –</a:t>
+            </a:r>
+            <a:r>
+              <a:rPr lang="en-US" b="0" i="0" cap="none" dirty="0">
+                <a:solidFill>
+                  <a:srgbClr val="FF0000"/>
+                </a:solidFill>
+                <a:effectLst/>
+                <a:latin typeface="Slack-Lato"/>
+              </a:rPr>
+              <a:t>Evan </a:t>
+            </a:r>
+            <a:r>
+              <a:rPr lang="en-US" b="0" i="0" cap="none" dirty="0" err="1">
+                <a:solidFill>
+                  <a:srgbClr val="FF0000"/>
+                </a:solidFill>
+                <a:effectLst/>
+                <a:latin typeface="Slack-Lato"/>
+              </a:rPr>
+              <a:t>todo</a:t>
+            </a:r>
+            <a:endParaRPr lang="en-US" b="0" i="0" cap="none" dirty="0">
+              <a:solidFill>
+                <a:srgbClr val="FF0000"/>
+              </a:solidFill>
+              <a:effectLst/>
+              <a:latin typeface="Slack-Lato"/>
+            </a:endParaRPr>
           </a:p>
           <a:p>
             <a:pPr lvl="1">
@@ -7328,11 +7365,18 @@
               <a:buAutoNum type="arabicPeriod"/>
             </a:pPr>
             <a:r>
+              <a:rPr lang="en-US" b="0" i="0" strike="sngStrike" cap="none" dirty="0">
+                <a:effectLst/>
+                <a:latin typeface="Slack-Lato"/>
+              </a:rPr>
+              <a:t>Jupyter Notebook  </a:t>
+            </a:r>
+            <a:r>
               <a:rPr lang="en-US" b="0" i="0" cap="none" dirty="0">
                 <a:effectLst/>
                 <a:latin typeface="Slack-Lato"/>
               </a:rPr>
-              <a:t>Jupyter Notebook to call your Flask API and get the results you need for your visualization.</a:t>
+              <a:t>Python app to call your Flask API and get the results you need for your visualization.</a:t>
             </a:r>
           </a:p>
           <a:p>
@@ -7345,7 +7389,7 @@
                 <a:effectLst/>
                 <a:latin typeface="Slack-Lato"/>
               </a:rPr>
-              <a:t>Save those results as raw JSON.</a:t>
+              <a:t>Save those results as raw JSON. (Will export similarly to CSV but in Flask API)</a:t>
             </a:r>
           </a:p>
           <a:p>

</xml_diff>

<commit_message>
ERS: Update outline. Added sources to README.
</commit_message>
<xml_diff>
--- a/Project_3_outline.pptx
+++ b/Project_3_outline.pptx
@@ -358,7 +358,7 @@
           <a:p>
             <a:fld id="{EDD99DFF-4D7C-4671-8EF0-23A72D1484EC}" type="datetimeFigureOut">
               <a:rPr lang="en-US" smtClean="0"/>
-              <a:t>7/24/2023</a:t>
+              <a:t>7/25/2023</a:t>
             </a:fld>
             <a:endParaRPr lang="en-US"/>
           </a:p>
@@ -670,7 +670,7 @@
           <a:p>
             <a:fld id="{EDD99DFF-4D7C-4671-8EF0-23A72D1484EC}" type="datetimeFigureOut">
               <a:rPr lang="en-US" smtClean="0"/>
-              <a:t>7/24/2023</a:t>
+              <a:t>7/25/2023</a:t>
             </a:fld>
             <a:endParaRPr lang="en-US"/>
           </a:p>
@@ -892,7 +892,7 @@
           <a:p>
             <a:fld id="{EDD99DFF-4D7C-4671-8EF0-23A72D1484EC}" type="datetimeFigureOut">
               <a:rPr lang="en-US" smtClean="0"/>
-              <a:t>7/24/2023</a:t>
+              <a:t>7/25/2023</a:t>
             </a:fld>
             <a:endParaRPr lang="en-US"/>
           </a:p>
@@ -1183,7 +1183,7 @@
           <a:p>
             <a:fld id="{EDD99DFF-4D7C-4671-8EF0-23A72D1484EC}" type="datetimeFigureOut">
               <a:rPr lang="en-US" smtClean="0"/>
-              <a:t>7/24/2023</a:t>
+              <a:t>7/25/2023</a:t>
             </a:fld>
             <a:endParaRPr lang="en-US"/>
           </a:p>
@@ -1637,7 +1637,7 @@
           <a:p>
             <a:fld id="{EDD99DFF-4D7C-4671-8EF0-23A72D1484EC}" type="datetimeFigureOut">
               <a:rPr lang="en-US" smtClean="0"/>
-              <a:t>7/24/2023</a:t>
+              <a:t>7/25/2023</a:t>
             </a:fld>
             <a:endParaRPr lang="en-US"/>
           </a:p>
@@ -2213,7 +2213,7 @@
           <a:p>
             <a:fld id="{EDD99DFF-4D7C-4671-8EF0-23A72D1484EC}" type="datetimeFigureOut">
               <a:rPr lang="en-US" smtClean="0"/>
-              <a:t>7/24/2023</a:t>
+              <a:t>7/25/2023</a:t>
             </a:fld>
             <a:endParaRPr lang="en-US"/>
           </a:p>
@@ -3065,7 +3065,7 @@
           <a:p>
             <a:fld id="{EDD99DFF-4D7C-4671-8EF0-23A72D1484EC}" type="datetimeFigureOut">
               <a:rPr lang="en-US" smtClean="0"/>
-              <a:t>7/24/2023</a:t>
+              <a:t>7/25/2023</a:t>
             </a:fld>
             <a:endParaRPr lang="en-US"/>
           </a:p>
@@ -3270,7 +3270,7 @@
           <a:p>
             <a:fld id="{EDD99DFF-4D7C-4671-8EF0-23A72D1484EC}" type="datetimeFigureOut">
               <a:rPr lang="en-US" smtClean="0"/>
-              <a:t>7/24/2023</a:t>
+              <a:t>7/25/2023</a:t>
             </a:fld>
             <a:endParaRPr lang="en-US"/>
           </a:p>
@@ -3484,7 +3484,7 @@
           <a:p>
             <a:fld id="{EDD99DFF-4D7C-4671-8EF0-23A72D1484EC}" type="datetimeFigureOut">
               <a:rPr lang="en-US" smtClean="0"/>
-              <a:t>7/24/2023</a:t>
+              <a:t>7/25/2023</a:t>
             </a:fld>
             <a:endParaRPr lang="en-US"/>
           </a:p>
@@ -3654,7 +3654,7 @@
           <a:p>
             <a:fld id="{EDD99DFF-4D7C-4671-8EF0-23A72D1484EC}" type="datetimeFigureOut">
               <a:rPr lang="en-US" smtClean="0"/>
-              <a:t>7/24/2023</a:t>
+              <a:t>7/25/2023</a:t>
             </a:fld>
             <a:endParaRPr lang="en-US"/>
           </a:p>
@@ -3859,7 +3859,7 @@
           <a:p>
             <a:fld id="{EDD99DFF-4D7C-4671-8EF0-23A72D1484EC}" type="datetimeFigureOut">
               <a:rPr lang="en-US" smtClean="0"/>
-              <a:t>7/24/2023</a:t>
+              <a:t>7/25/2023</a:t>
             </a:fld>
             <a:endParaRPr lang="en-US"/>
           </a:p>
@@ -4139,7 +4139,7 @@
           <a:p>
             <a:fld id="{EDD99DFF-4D7C-4671-8EF0-23A72D1484EC}" type="datetimeFigureOut">
               <a:rPr lang="en-US" smtClean="0"/>
-              <a:t>7/24/2023</a:t>
+              <a:t>7/25/2023</a:t>
             </a:fld>
             <a:endParaRPr lang="en-US"/>
           </a:p>
@@ -4406,7 +4406,7 @@
           <a:p>
             <a:fld id="{EDD99DFF-4D7C-4671-8EF0-23A72D1484EC}" type="datetimeFigureOut">
               <a:rPr lang="en-US" smtClean="0"/>
-              <a:t>7/24/2023</a:t>
+              <a:t>7/25/2023</a:t>
             </a:fld>
             <a:endParaRPr lang="en-US"/>
           </a:p>
@@ -4821,7 +4821,7 @@
           <a:p>
             <a:fld id="{EDD99DFF-4D7C-4671-8EF0-23A72D1484EC}" type="datetimeFigureOut">
               <a:rPr lang="en-US" smtClean="0"/>
-              <a:t>7/24/2023</a:t>
+              <a:t>7/25/2023</a:t>
             </a:fld>
             <a:endParaRPr lang="en-US"/>
           </a:p>
@@ -4969,7 +4969,7 @@
           <a:p>
             <a:fld id="{EDD99DFF-4D7C-4671-8EF0-23A72D1484EC}" type="datetimeFigureOut">
               <a:rPr lang="en-US" smtClean="0"/>
-              <a:t>7/24/2023</a:t>
+              <a:t>7/25/2023</a:t>
             </a:fld>
             <a:endParaRPr lang="en-US"/>
           </a:p>
@@ -5094,7 +5094,7 @@
           <a:p>
             <a:fld id="{EDD99DFF-4D7C-4671-8EF0-23A72D1484EC}" type="datetimeFigureOut">
               <a:rPr lang="en-US" smtClean="0"/>
-              <a:t>7/24/2023</a:t>
+              <a:t>7/25/2023</a:t>
             </a:fld>
             <a:endParaRPr lang="en-US"/>
           </a:p>
@@ -5373,7 +5373,7 @@
           <a:p>
             <a:fld id="{EDD99DFF-4D7C-4671-8EF0-23A72D1484EC}" type="datetimeFigureOut">
               <a:rPr lang="en-US" smtClean="0"/>
-              <a:t>7/24/2023</a:t>
+              <a:t>7/25/2023</a:t>
             </a:fld>
             <a:endParaRPr lang="en-US"/>
           </a:p>
@@ -5685,7 +5685,7 @@
           <a:p>
             <a:fld id="{EDD99DFF-4D7C-4671-8EF0-23A72D1484EC}" type="datetimeFigureOut">
               <a:rPr lang="en-US" smtClean="0"/>
-              <a:t>7/24/2023</a:t>
+              <a:t>7/25/2023</a:t>
             </a:fld>
             <a:endParaRPr lang="en-US"/>
           </a:p>
@@ -5938,7 +5938,7 @@
           <a:p>
             <a:fld id="{EDD99DFF-4D7C-4671-8EF0-23A72D1484EC}" type="datetimeFigureOut">
               <a:rPr lang="en-US" smtClean="0"/>
-              <a:t>7/24/2023</a:t>
+              <a:t>7/25/2023</a:t>
             </a:fld>
             <a:endParaRPr lang="en-US"/>
           </a:p>
@@ -7543,7 +7543,7 @@
         <p:spPr>
           <a:xfrm>
             <a:off x="6191249" y="1149350"/>
-            <a:ext cx="5708963" cy="4893647"/>
+            <a:ext cx="5708963" cy="4970591"/>
           </a:xfrm>
           <a:prstGeom prst="rect">
             <a:avLst/>
@@ -7695,23 +7695,23 @@
               <a:buChar char="-"/>
             </a:pPr>
             <a:r>
-              <a:rPr lang="en-US" sz="1200" dirty="0"/>
+              <a:rPr lang="en-US" sz="1000" dirty="0"/>
               <a:t>Consider bringing data scrape .</a:t>
             </a:r>
             <a:r>
-              <a:rPr lang="en-US" sz="1200" dirty="0" err="1"/>
+              <a:rPr lang="en-US" sz="1000" dirty="0" err="1"/>
               <a:t>py</a:t>
             </a:r>
             <a:r>
-              <a:rPr lang="en-US" sz="1200" dirty="0"/>
+              <a:rPr lang="en-US" sz="1000" dirty="0"/>
               <a:t> files into single python script to run all </a:t>
             </a:r>
             <a:r>
-              <a:rPr lang="en-US" sz="1200" dirty="0" err="1"/>
+              <a:rPr lang="en-US" sz="1000" dirty="0" err="1"/>
               <a:t>en</a:t>
             </a:r>
             <a:r>
-              <a:rPr lang="en-US" sz="1200" dirty="0"/>
+              <a:rPr lang="en-US" sz="1000" dirty="0"/>
               <a:t> masse. </a:t>
             </a:r>
           </a:p>
@@ -7721,16 +7721,50 @@
               <a:buChar char="-"/>
             </a:pPr>
             <a:r>
+              <a:rPr lang="en-US" sz="1000" dirty="0"/>
+              <a:t>Add </a:t>
+            </a:r>
+            <a:r>
+              <a:rPr lang="en-US" sz="1000" dirty="0" err="1"/>
+              <a:t>python_to_postgres</a:t>
+            </a:r>
+            <a:r>
+              <a:rPr lang="en-US" sz="1000" dirty="0"/>
+              <a:t> function within data scrape.py files to export DataFrames to SQL with config file reference (retain the CSV export outputs in those data scrape.py files)</a:t>
+            </a:r>
+          </a:p>
+          <a:p>
+            <a:pPr marL="285750" indent="-285750">
+              <a:buFontTx/>
+              <a:buChar char="-"/>
+            </a:pPr>
+            <a:r>
               <a:rPr lang="en-US" sz="1200" dirty="0"/>
-              <a:t>Add </a:t>
+              <a:t>Evan working on getting flask </a:t>
             </a:r>
             <a:r>
               <a:rPr lang="en-US" sz="1200" dirty="0" err="1"/>
-              <a:t>python_to_postgres</a:t>
+              <a:t>api</a:t>
             </a:r>
             <a:r>
               <a:rPr lang="en-US" sz="1200" dirty="0"/>
-              <a:t> function within data scrape.py files to export DataFrames to SQL with config file reference (retain the CSV export outputs in those data scrape.py files)</a:t>
+              <a:t> reflection of each </a:t>
+            </a:r>
+            <a:r>
+              <a:rPr lang="en-US" sz="1200" dirty="0" err="1"/>
+              <a:t>postgres</a:t>
+            </a:r>
+            <a:r>
+              <a:rPr lang="en-US" sz="1200" dirty="0"/>
+              <a:t> table. </a:t>
+            </a:r>
+            <a:r>
+              <a:rPr lang="en-US" sz="1200" dirty="0">
+                <a:solidFill>
+                  <a:srgbClr val="FF0000"/>
+                </a:solidFill>
+              </a:rPr>
+              <a:t>Confirm output APIs are able to be imported to the JavaScript code.</a:t>
             </a:r>
           </a:p>
           <a:p>

</xml_diff>

<commit_message>
ERS: updated outline with actions following group review.
</commit_message>
<xml_diff>
--- a/Project_3_outline.pptx
+++ b/Project_3_outline.pptx
@@ -9,10 +9,11 @@
     <p:sldId id="261" r:id="rId3"/>
     <p:sldId id="259" r:id="rId4"/>
     <p:sldId id="265" r:id="rId5"/>
-    <p:sldId id="260" r:id="rId6"/>
-    <p:sldId id="262" r:id="rId7"/>
-    <p:sldId id="263" r:id="rId8"/>
-    <p:sldId id="264" r:id="rId9"/>
+    <p:sldId id="266" r:id="rId6"/>
+    <p:sldId id="260" r:id="rId7"/>
+    <p:sldId id="262" r:id="rId8"/>
+    <p:sldId id="263" r:id="rId9"/>
+    <p:sldId id="264" r:id="rId10"/>
   </p:sldIdLst>
   <p:sldSz cx="12192000" cy="6858000"/>
   <p:notesSz cx="6858000" cy="9144000"/>
@@ -7339,25 +7340,8 @@
                 <a:effectLst/>
                 <a:latin typeface="Slack-Lato"/>
               </a:rPr>
-              <a:t>Evan </a:t>
-            </a:r>
-            <a:r>
-              <a:rPr lang="en-US" b="0" i="0" cap="none" dirty="0" err="1">
-                <a:solidFill>
-                  <a:srgbClr val="FF0000"/>
-                </a:solidFill>
-                <a:effectLst/>
-                <a:latin typeface="Slack-Lato"/>
-              </a:rPr>
-              <a:t>todo</a:t>
-            </a:r>
-            <a:endParaRPr lang="en-US" b="0" i="0" cap="none" dirty="0">
-              <a:solidFill>
-                <a:srgbClr val="FF0000"/>
-              </a:solidFill>
-              <a:effectLst/>
-              <a:latin typeface="Slack-Lato"/>
-            </a:endParaRPr>
+              <a:t>Evan todo</a:t>
+            </a:r>
           </a:p>
           <a:p>
             <a:pPr lvl="1">
@@ -7452,6 +7436,285 @@
           <p:cNvPr id="2" name="Title 1">
             <a:extLst>
               <a:ext uri="{FF2B5EF4-FFF2-40B4-BE49-F238E27FC236}">
+                <a16:creationId xmlns:a16="http://schemas.microsoft.com/office/drawing/2014/main" id="{E2A731D5-059B-9742-A553-691BA1FFAFB9}"/>
+              </a:ext>
+            </a:extLst>
+          </p:cNvPr>
+          <p:cNvSpPr>
+            <a:spLocks noGrp="1"/>
+          </p:cNvSpPr>
+          <p:nvPr>
+            <p:ph type="title"/>
+          </p:nvPr>
+        </p:nvSpPr>
+        <p:spPr>
+          <a:xfrm>
+            <a:off x="913774" y="10201"/>
+            <a:ext cx="10364451" cy="1596177"/>
+          </a:xfrm>
+        </p:spPr>
+        <p:txBody>
+          <a:bodyPr/>
+          <a:lstStyle/>
+          <a:p>
+            <a:r>
+              <a:rPr lang="en-US" cap="none" dirty="0">
+                <a:solidFill>
+                  <a:srgbClr val="FF0000"/>
+                </a:solidFill>
+              </a:rPr>
+              <a:t>Tues July 25: Immediate todo items for finishing visualizations</a:t>
+            </a:r>
+          </a:p>
+        </p:txBody>
+      </p:sp>
+      <p:sp>
+        <p:nvSpPr>
+          <p:cNvPr id="3" name="Content Placeholder 2">
+            <a:extLst>
+              <a:ext uri="{FF2B5EF4-FFF2-40B4-BE49-F238E27FC236}">
+                <a16:creationId xmlns:a16="http://schemas.microsoft.com/office/drawing/2014/main" id="{0017D775-90AA-3BC4-8EFE-3AC36C376C96}"/>
+              </a:ext>
+            </a:extLst>
+          </p:cNvPr>
+          <p:cNvSpPr>
+            <a:spLocks noGrp="1"/>
+          </p:cNvSpPr>
+          <p:nvPr>
+            <p:ph idx="1"/>
+          </p:nvPr>
+        </p:nvSpPr>
+        <p:spPr>
+          <a:xfrm>
+            <a:off x="913775" y="1606378"/>
+            <a:ext cx="10364452" cy="4893275"/>
+          </a:xfrm>
+        </p:spPr>
+        <p:txBody>
+          <a:bodyPr>
+            <a:normAutofit fontScale="70000" lnSpcReduction="20000"/>
+          </a:bodyPr>
+          <a:lstStyle/>
+          <a:p>
+            <a:r>
+              <a:rPr lang="en-US" cap="none" dirty="0"/>
+              <a:t>CSVs (data) need to be updated to include </a:t>
+            </a:r>
+            <a:r>
+              <a:rPr lang="en-US" cap="none" dirty="0" err="1"/>
+              <a:t>countyID</a:t>
+            </a:r>
+            <a:r>
+              <a:rPr lang="en-US" cap="none" dirty="0"/>
+              <a:t> numbers.  If you can add latitude and longitude values, that’d would be helpful. (Ryan just about complete with cleaning, regex stuff. </a:t>
+            </a:r>
+            <a:r>
+              <a:rPr lang="en-US" cap="none" dirty="0" err="1"/>
+              <a:t>Noice</a:t>
+            </a:r>
+            <a:r>
+              <a:rPr lang="en-US" cap="none" dirty="0"/>
+              <a:t>.)</a:t>
+            </a:r>
+          </a:p>
+          <a:p>
+            <a:r>
+              <a:rPr lang="en-US" cap="none" dirty="0">
+                <a:solidFill>
+                  <a:srgbClr val="FF0000"/>
+                </a:solidFill>
+              </a:rPr>
+              <a:t>Evan</a:t>
+            </a:r>
+            <a:r>
+              <a:rPr lang="en-US" cap="none" dirty="0"/>
+              <a:t> to update app.py to output values with key-value pairs. Current list of lists not good for importing data to JavaScript. Get into dictionary of dictionaries with key-value pair.</a:t>
+            </a:r>
+          </a:p>
+          <a:p>
+            <a:r>
+              <a:rPr lang="en-US" cap="none" dirty="0"/>
+              <a:t>Resolve issue: CSV data not being pulled into JSON in entirety, in Kevin’s Jupyter notebook. </a:t>
+            </a:r>
+          </a:p>
+          <a:p>
+            <a:pPr lvl="1"/>
+            <a:r>
+              <a:rPr lang="en-US" cap="none" dirty="0"/>
+              <a:t>About half the data is getting imported. No idea what the issue is. Hopefully Flask JSON API will fix this… Or the cleaned data from Ryan. Check on this Wed. PM.</a:t>
+            </a:r>
+          </a:p>
+          <a:p>
+            <a:r>
+              <a:rPr lang="en-US" cap="none" dirty="0"/>
+              <a:t>Add latitude and longitude data to temperature and precipitation </a:t>
+            </a:r>
+            <a:r>
+              <a:rPr lang="en-US" cap="none" dirty="0" err="1"/>
+              <a:t>dataframes</a:t>
+            </a:r>
+            <a:r>
+              <a:rPr lang="en-US" cap="none" dirty="0"/>
+              <a:t>. (Timothy and Evan)</a:t>
+            </a:r>
+          </a:p>
+          <a:p>
+            <a:r>
+              <a:rPr lang="en-US" cap="none" dirty="0"/>
+              <a:t>Set up import of Flask API data into JavaScript. Currently importing CSV file data. (Evan, because need to update app.py outputs)</a:t>
+            </a:r>
+          </a:p>
+          <a:p>
+            <a:r>
+              <a:rPr lang="en-US" cap="none" dirty="0">
+                <a:solidFill>
+                  <a:srgbClr val="FF0000"/>
+                </a:solidFill>
+              </a:rPr>
+              <a:t>Miranda</a:t>
+            </a:r>
+            <a:r>
+              <a:rPr lang="en-US" cap="none" dirty="0"/>
+              <a:t> to convert temperature and </a:t>
+            </a:r>
+            <a:r>
+              <a:rPr lang="en-US" cap="none" dirty="0" err="1"/>
+              <a:t>precip</a:t>
+            </a:r>
+            <a:r>
+              <a:rPr lang="en-US" cap="none" dirty="0"/>
+              <a:t> data into same horizontal year format as the West Nile and Lyme data. Make copies of the “Data Collection” .</a:t>
+            </a:r>
+            <a:r>
+              <a:rPr lang="en-US" cap="none" dirty="0" err="1"/>
+              <a:t>py</a:t>
+            </a:r>
+            <a:r>
+              <a:rPr lang="en-US" cap="none" dirty="0"/>
+              <a:t> files.</a:t>
+            </a:r>
+          </a:p>
+          <a:p>
+            <a:r>
+              <a:rPr lang="en-US" cap="none" dirty="0"/>
+              <a:t>Heatmap not scaling by magnitude. Only density of case reports. </a:t>
+            </a:r>
+            <a:r>
+              <a:rPr lang="en-US" cap="none" dirty="0">
+                <a:solidFill>
+                  <a:srgbClr val="FF0000"/>
+                </a:solidFill>
+              </a:rPr>
+              <a:t>Kevin</a:t>
+            </a:r>
+            <a:r>
+              <a:rPr lang="en-US" cap="none" dirty="0"/>
+              <a:t> to continue working this. Miranda to look into as well.</a:t>
+            </a:r>
+          </a:p>
+          <a:p>
+            <a:pPr lvl="1"/>
+            <a:r>
+              <a:rPr lang="en-US" cap="none" dirty="0"/>
+              <a:t>Consider using circles instead of heatmap plugin due to issue with displaying magnitude. </a:t>
+            </a:r>
+          </a:p>
+          <a:p>
+            <a:r>
+              <a:rPr lang="en-US" cap="none" dirty="0">
+                <a:solidFill>
+                  <a:srgbClr val="FF0000"/>
+                </a:solidFill>
+              </a:rPr>
+              <a:t>Figure out how to get the data from Flask API to JavaScript for live visualization. (Evan to start. Ryan help me on this </a:t>
+            </a:r>
+            <a:r>
+              <a:rPr lang="en-US" cap="none" dirty="0" err="1">
+                <a:solidFill>
+                  <a:srgbClr val="FF0000"/>
+                </a:solidFill>
+              </a:rPr>
+              <a:t>pleeease</a:t>
+            </a:r>
+            <a:r>
+              <a:rPr lang="en-US" cap="none" dirty="0">
+                <a:solidFill>
+                  <a:srgbClr val="FF0000"/>
+                </a:solidFill>
+              </a:rPr>
+              <a:t>). Look into on Thurs.</a:t>
+            </a:r>
+          </a:p>
+          <a:p>
+            <a:r>
+              <a:rPr lang="en-US" cap="none" dirty="0"/>
+              <a:t>How to visualize temperature/</a:t>
+            </a:r>
+            <a:r>
+              <a:rPr lang="en-US" cap="none" dirty="0" err="1"/>
+              <a:t>precip</a:t>
+            </a:r>
+            <a:r>
+              <a:rPr lang="en-US" cap="none" dirty="0"/>
+              <a:t> over time visual. (All look </a:t>
+            </a:r>
+            <a:r>
+              <a:rPr lang="en-US" cap="none"/>
+              <a:t>into this last).</a:t>
+            </a:r>
+            <a:endParaRPr lang="en-US" cap="none" dirty="0"/>
+          </a:p>
+          <a:p>
+            <a:pPr lvl="1"/>
+            <a:r>
+              <a:rPr lang="en-US" cap="none" dirty="0"/>
+              <a:t>Example slider with play button: </a:t>
+            </a:r>
+            <a:r>
+              <a:rPr lang="en-US" cap="none" dirty="0">
+                <a:hlinkClick r:id="rId2"/>
+              </a:rPr>
+              <a:t>https://stackoverflow.com/questions/44162454/leaflet-time-slider-play-button</a:t>
+            </a:r>
+            <a:endParaRPr lang="en-US" cap="none" dirty="0"/>
+          </a:p>
+        </p:txBody>
+      </p:sp>
+    </p:spTree>
+    <p:extLst>
+      <p:ext uri="{BB962C8B-B14F-4D97-AF65-F5344CB8AC3E}">
+        <p14:creationId xmlns:p14="http://schemas.microsoft.com/office/powerpoint/2010/main" val="2687347732"/>
+      </p:ext>
+    </p:extLst>
+  </p:cSld>
+  <p:clrMapOvr>
+    <a:masterClrMapping/>
+  </p:clrMapOvr>
+</p:sld>
+</file>
+
+<file path=ppt/slides/slide6.xml><?xml version="1.0" encoding="utf-8"?>
+<p:sld xmlns:a="http://schemas.openxmlformats.org/drawingml/2006/main" xmlns:r="http://schemas.openxmlformats.org/officeDocument/2006/relationships" xmlns:p="http://schemas.openxmlformats.org/presentationml/2006/main">
+  <p:cSld>
+    <p:spTree>
+      <p:nvGrpSpPr>
+        <p:cNvPr id="1" name=""/>
+        <p:cNvGrpSpPr/>
+        <p:nvPr/>
+      </p:nvGrpSpPr>
+      <p:grpSpPr>
+        <a:xfrm>
+          <a:off x="0" y="0"/>
+          <a:ext cx="0" cy="0"/>
+          <a:chOff x="0" y="0"/>
+          <a:chExt cx="0" cy="0"/>
+        </a:xfrm>
+      </p:grpSpPr>
+      <p:sp>
+        <p:nvSpPr>
+          <p:cNvPr id="2" name="Title 1">
+            <a:extLst>
+              <a:ext uri="{FF2B5EF4-FFF2-40B4-BE49-F238E27FC236}">
                 <a16:creationId xmlns:a16="http://schemas.microsoft.com/office/drawing/2014/main" id="{8872C89C-B66B-5120-6244-83640E945E97}"/>
               </a:ext>
             </a:extLst>
@@ -7543,7 +7806,7 @@
         <p:spPr>
           <a:xfrm>
             <a:off x="6191249" y="1149350"/>
-            <a:ext cx="5708963" cy="4970591"/>
+            <a:ext cx="5708963" cy="5139869"/>
           </a:xfrm>
           <a:prstGeom prst="rect">
             <a:avLst/>
@@ -7764,7 +8027,7 @@
                   <a:srgbClr val="FF0000"/>
                 </a:solidFill>
               </a:rPr>
-              <a:t>Confirm output APIs are able to be imported to the JavaScript code.</a:t>
+              <a:t>Confirm output APIs are able to be imported to the JavaScript code. Convert the row objects into dictionary of dictionaries with key-value pairs. Need to reference the key name </a:t>
             </a:r>
           </a:p>
           <a:p>
@@ -7986,7 +8249,7 @@
 </p:sld>
 </file>
 
-<file path=ppt/slides/slide6.xml><?xml version="1.0" encoding="utf-8"?>
+<file path=ppt/slides/slide7.xml><?xml version="1.0" encoding="utf-8"?>
 <p:sld xmlns:a="http://schemas.openxmlformats.org/drawingml/2006/main" xmlns:r="http://schemas.openxmlformats.org/officeDocument/2006/relationships" xmlns:p="http://schemas.openxmlformats.org/presentationml/2006/main">
   <p:cSld>
     <p:spTree>
@@ -8099,7 +8362,7 @@
         <p:spPr>
           <a:xfrm>
             <a:off x="6191250" y="2131033"/>
-            <a:ext cx="5708963" cy="4862870"/>
+            <a:ext cx="5708963" cy="6524863"/>
           </a:xfrm>
           <a:prstGeom prst="rect">
             <a:avLst/>
@@ -8179,10 +8442,72 @@
             <a:endParaRPr lang="en-US" dirty="0"/>
           </a:p>
           <a:p>
+            <a:pPr marL="285750" indent="-285750">
+              <a:buFontTx/>
+              <a:buChar char="-"/>
+            </a:pPr>
+            <a:r>
+              <a:rPr lang="en-US" dirty="0"/>
+              <a:t>Kevin needs help getting magnitude to display on the </a:t>
+            </a:r>
+            <a:r>
+              <a:rPr lang="en-US" dirty="0" err="1"/>
+              <a:t>leafly</a:t>
+            </a:r>
+            <a:r>
+              <a:rPr lang="en-US" dirty="0"/>
+              <a:t> heatmaps.</a:t>
+            </a:r>
+          </a:p>
+          <a:p>
+            <a:pPr marL="285750" indent="-285750">
+              <a:buFontTx/>
+              <a:buChar char="-"/>
+            </a:pPr>
             <a:endParaRPr lang="en-US" dirty="0"/>
           </a:p>
           <a:p>
+            <a:pPr marL="285750" indent="-285750">
+              <a:buFontTx/>
+              <a:buChar char="-"/>
+            </a:pPr>
             <a:endParaRPr lang="en-US" dirty="0"/>
+          </a:p>
+          <a:p>
+            <a:pPr marL="285750" indent="-285750">
+              <a:buFontTx/>
+              <a:buChar char="-"/>
+            </a:pPr>
+            <a:r>
+              <a:rPr lang="en-US" dirty="0"/>
+              <a:t>Todo: map temperature and </a:t>
+            </a:r>
+            <a:r>
+              <a:rPr lang="en-US" dirty="0" err="1"/>
+              <a:t>precip</a:t>
+            </a:r>
+            <a:r>
+              <a:rPr lang="en-US" dirty="0"/>
+              <a:t> in the bottom map. Scale color by temperature or </a:t>
+            </a:r>
+            <a:r>
+              <a:rPr lang="en-US" dirty="0" err="1"/>
+              <a:t>precip</a:t>
+            </a:r>
+            <a:r>
+              <a:rPr lang="en-US" dirty="0"/>
+              <a:t> amounts</a:t>
+            </a:r>
+          </a:p>
+          <a:p>
+            <a:pPr marL="742950" lvl="1" indent="-285750">
+              <a:buFontTx/>
+              <a:buChar char="-"/>
+            </a:pPr>
+            <a:r>
+              <a:rPr lang="en-US" dirty="0"/>
+              <a:t>Dropdown to switch between temperature and precipitation maps.</a:t>
+            </a:r>
           </a:p>
           <a:p>
             <a:endParaRPr lang="en-US" dirty="0"/>
@@ -8417,7 +8742,7 @@
 </p:sld>
 </file>
 
-<file path=ppt/slides/slide7.xml><?xml version="1.0" encoding="utf-8"?>
+<file path=ppt/slides/slide8.xml><?xml version="1.0" encoding="utf-8"?>
 <p:sld xmlns:a="http://schemas.openxmlformats.org/drawingml/2006/main" xmlns:r="http://schemas.openxmlformats.org/officeDocument/2006/relationships" xmlns:p="http://schemas.openxmlformats.org/presentationml/2006/main">
   <p:cSld>
     <p:spTree>
@@ -8530,7 +8855,7 @@
         <p:spPr>
           <a:xfrm>
             <a:off x="6191250" y="2131033"/>
-            <a:ext cx="5708963" cy="3139321"/>
+            <a:ext cx="5708963" cy="3693319"/>
           </a:xfrm>
           <a:prstGeom prst="rect">
             <a:avLst/>
@@ -8566,6 +8891,19 @@
             <a:r>
               <a:rPr lang="en-US" dirty="0"/>
               <a:t>Might need to see if we can “gray out” counties that didn’t report.  Add null counties to list to be a gray layer in the visual (if able).</a:t>
+            </a:r>
+          </a:p>
+          <a:p>
+            <a:endParaRPr lang="en-US" dirty="0"/>
+          </a:p>
+          <a:p>
+            <a:r>
+              <a:rPr lang="en-US" dirty="0">
+                <a:solidFill>
+                  <a:srgbClr val="FF0000"/>
+                </a:solidFill>
+              </a:rPr>
+              <a:t>Does this need to be deployed to github pages??</a:t>
             </a:r>
           </a:p>
           <a:p>
@@ -8744,7 +9082,7 @@
 </p:sld>
 </file>
 
-<file path=ppt/slides/slide8.xml><?xml version="1.0" encoding="utf-8"?>
+<file path=ppt/slides/slide9.xml><?xml version="1.0" encoding="utf-8"?>
 <p:sld xmlns:a="http://schemas.openxmlformats.org/drawingml/2006/main" xmlns:r="http://schemas.openxmlformats.org/officeDocument/2006/relationships" xmlns:p="http://schemas.openxmlformats.org/presentationml/2006/main">
   <p:cSld>
     <p:spTree>

</xml_diff>

<commit_message>
ERS: Update tasks completion in outline.
</commit_message>
<xml_diff>
--- a/Project_3_outline.pptx
+++ b/Project_3_outline.pptx
@@ -7497,27 +7497,64 @@
           <a:lstStyle/>
           <a:p>
             <a:r>
+              <a:rPr lang="en-US" strike="sngStrike" cap="none" dirty="0"/>
+              <a:t>CSVs (data) need to be updated to include </a:t>
+            </a:r>
+            <a:r>
+              <a:rPr lang="en-US" strike="sngStrike" cap="none" dirty="0" err="1"/>
+              <a:t>countyID</a:t>
+            </a:r>
+            <a:r>
+              <a:rPr lang="en-US" strike="sngStrike" cap="none" dirty="0"/>
+              <a:t> numbers.  If you can add latitude and longitude values, that’d would be helpful. (Ryan just about complete with cleaning, regex stuff. </a:t>
+            </a:r>
+            <a:r>
+              <a:rPr lang="en-US" strike="sngStrike" cap="none" dirty="0" err="1"/>
+              <a:t>Noice</a:t>
+            </a:r>
+            <a:r>
+              <a:rPr lang="en-US" strike="sngStrike" cap="none" dirty="0"/>
+              <a:t>.)</a:t>
+            </a:r>
+          </a:p>
+          <a:p>
+            <a:r>
+              <a:rPr lang="en-US" strike="sngStrike" cap="none" dirty="0"/>
+              <a:t>Evan to update app.py to output values with key-value pairs. Current list of lists not good for importing data to JavaScript. Get into dictionary of dictionaries with key-value pair.</a:t>
+            </a:r>
+          </a:p>
+          <a:p>
+            <a:r>
               <a:rPr lang="en-US" cap="none" dirty="0"/>
-              <a:t>CSVs (data) need to be updated to include </a:t>
+              <a:t>Resolve issue: CSV data not being pulled into JSON in entirety, in Kevin’s Jupyter notebook. </a:t>
+            </a:r>
+          </a:p>
+          <a:p>
+            <a:pPr lvl="1"/>
+            <a:r>
+              <a:rPr lang="en-US" cap="none" dirty="0"/>
+              <a:t>About half the data is getting imported. No idea what the issue is. Hopefully Flask JSON API will fix this… Or the cleaned data from Ryan. Check on this Wed. PM.</a:t>
+            </a:r>
+          </a:p>
+          <a:p>
+            <a:r>
+              <a:rPr lang="en-US" cap="none" dirty="0"/>
+              <a:t>Add latitude and longitude data to temperature and precipitation </a:t>
             </a:r>
             <a:r>
               <a:rPr lang="en-US" cap="none" dirty="0" err="1"/>
-              <a:t>countyID</a:t>
+              <a:t>dataframes</a:t>
             </a:r>
             <a:r>
               <a:rPr lang="en-US" cap="none" dirty="0"/>
-              <a:t> numbers.  If you can add latitude and longitude values, that’d would be helpful. (Ryan just about complete with cleaning, regex stuff. </a:t>
-            </a:r>
-            <a:r>
-              <a:rPr lang="en-US" cap="none" dirty="0" err="1"/>
-              <a:t>Noice</a:t>
-            </a:r>
+              <a:t>. (Timothy)</a:t>
+            </a:r>
+          </a:p>
+          <a:p>
             <a:r>
               <a:rPr lang="en-US" cap="none" dirty="0"/>
-              <a:t>.)</a:t>
-            </a:r>
-          </a:p>
-          <a:p>
+              <a:t>Set up import of Flask API data into JavaScript. Currently importing CSV file data. (</a:t>
+            </a:r>
             <a:r>
               <a:rPr lang="en-US" cap="none" dirty="0">
                 <a:solidFill>
@@ -7528,43 +7565,48 @@
             </a:r>
             <a:r>
               <a:rPr lang="en-US" cap="none" dirty="0"/>
-              <a:t> to update app.py to output values with key-value pairs. Current list of lists not good for importing data to JavaScript. Get into dictionary of dictionaries with key-value pair.</a:t>
+              <a:t>, because need to update app.py outputs)</a:t>
+            </a:r>
+          </a:p>
+          <a:p>
+            <a:r>
+              <a:rPr lang="en-US" strike="sngStrike" cap="none" dirty="0"/>
+              <a:t>Miranda to convert temperature and </a:t>
+            </a:r>
+            <a:r>
+              <a:rPr lang="en-US" strike="sngStrike" cap="none" dirty="0" err="1"/>
+              <a:t>precip</a:t>
+            </a:r>
+            <a:r>
+              <a:rPr lang="en-US" strike="sngStrike" cap="none" dirty="0"/>
+              <a:t> data into same horizontal year format as the West Nile and Lyme data. Make copies of the “Data Collection” .</a:t>
+            </a:r>
+            <a:r>
+              <a:rPr lang="en-US" strike="sngStrike" cap="none" dirty="0" err="1"/>
+              <a:t>py</a:t>
+            </a:r>
+            <a:r>
+              <a:rPr lang="en-US" strike="sngStrike" cap="none" dirty="0"/>
+              <a:t> files.</a:t>
             </a:r>
           </a:p>
           <a:p>
             <a:r>
               <a:rPr lang="en-US" cap="none" dirty="0"/>
-              <a:t>Resolve issue: CSV data not being pulled into JSON in entirety, in Kevin’s Jupyter notebook. </a:t>
-            </a:r>
-          </a:p>
-          <a:p>
-            <a:pPr lvl="1"/>
+              <a:t>Heatmap not scaling by magnitude. Only density of case reports. </a:t>
+            </a:r>
+            <a:r>
+              <a:rPr lang="en-US" cap="none" dirty="0">
+                <a:solidFill>
+                  <a:srgbClr val="FF0000"/>
+                </a:solidFill>
+              </a:rPr>
+              <a:t>Kevin</a:t>
+            </a:r>
             <a:r>
               <a:rPr lang="en-US" cap="none" dirty="0"/>
-              <a:t>About half the data is getting imported. No idea what the issue is. Hopefully Flask JSON API will fix this… Or the cleaned data from Ryan. Check on this Wed. PM.</a:t>
-            </a:r>
-          </a:p>
-          <a:p>
-            <a:r>
-              <a:rPr lang="en-US" cap="none" dirty="0"/>
-              <a:t>Add latitude and longitude data to temperature and precipitation </a:t>
-            </a:r>
-            <a:r>
-              <a:rPr lang="en-US" cap="none" dirty="0" err="1"/>
-              <a:t>dataframes</a:t>
-            </a:r>
-            <a:r>
-              <a:rPr lang="en-US" cap="none" dirty="0"/>
-              <a:t>. (Timothy and Evan)</a:t>
-            </a:r>
-          </a:p>
-          <a:p>
-            <a:r>
-              <a:rPr lang="en-US" cap="none" dirty="0"/>
-              <a:t>Set up import of Flask API data into JavaScript. Currently importing CSV file data. (Evan, because need to update app.py outputs)</a:t>
-            </a:r>
-          </a:p>
-          <a:p>
+              <a:t> to continue working this. </a:t>
+            </a:r>
             <a:r>
               <a:rPr lang="en-US" cap="none" dirty="0">
                 <a:solidFill>
@@ -7575,41 +7617,7 @@
             </a:r>
             <a:r>
               <a:rPr lang="en-US" cap="none" dirty="0"/>
-              <a:t> to convert temperature and </a:t>
-            </a:r>
-            <a:r>
-              <a:rPr lang="en-US" cap="none" dirty="0" err="1"/>
-              <a:t>precip</a:t>
-            </a:r>
-            <a:r>
-              <a:rPr lang="en-US" cap="none" dirty="0"/>
-              <a:t> data into same horizontal year format as the West Nile and Lyme data. Make copies of the “Data Collection” .</a:t>
-            </a:r>
-            <a:r>
-              <a:rPr lang="en-US" cap="none" dirty="0" err="1"/>
-              <a:t>py</a:t>
-            </a:r>
-            <a:r>
-              <a:rPr lang="en-US" cap="none" dirty="0"/>
-              <a:t> files.</a:t>
-            </a:r>
-          </a:p>
-          <a:p>
-            <a:r>
-              <a:rPr lang="en-US" cap="none" dirty="0"/>
-              <a:t>Heatmap not scaling by magnitude. Only density of case reports. </a:t>
-            </a:r>
-            <a:r>
-              <a:rPr lang="en-US" cap="none" dirty="0">
-                <a:solidFill>
-                  <a:srgbClr val="FF0000"/>
-                </a:solidFill>
-              </a:rPr>
-              <a:t>Kevin</a:t>
-            </a:r>
-            <a:r>
-              <a:rPr lang="en-US" cap="none" dirty="0"/>
-              <a:t> to continue working this. Miranda to look into as well.</a:t>
+              <a:t> to look into as well.</a:t>
             </a:r>
           </a:p>
           <a:p>
@@ -7656,13 +7664,8 @@
             </a:r>
             <a:r>
               <a:rPr lang="en-US" cap="none" dirty="0"/>
-              <a:t> over time visual. (All look </a:t>
-            </a:r>
-            <a:r>
-              <a:rPr lang="en-US" cap="none"/>
-              <a:t>into this last).</a:t>
-            </a:r>
-            <a:endParaRPr lang="en-US" cap="none" dirty="0"/>
+              <a:t> over time visual. (All look into this last).</a:t>
+            </a:r>
           </a:p>
           <a:p>
             <a:pPr lvl="1"/>
@@ -7948,7 +7951,7 @@
               <a:buChar char="-"/>
             </a:pPr>
             <a:r>
-              <a:rPr lang="en-US" sz="1200" dirty="0"/>
+              <a:rPr lang="en-US" sz="1200" strike="sngStrike" dirty="0"/>
               <a:t>Include instructions in the README for all data scraping and database setup steps.</a:t>
             </a:r>
           </a:p>
@@ -8002,24 +8005,28 @@
               <a:buChar char="-"/>
             </a:pPr>
             <a:r>
+              <a:rPr lang="en-US" sz="1200" strike="sngStrike" dirty="0"/>
+              <a:t>Evan working on getting flask </a:t>
+            </a:r>
+            <a:r>
+              <a:rPr lang="en-US" sz="1200" strike="sngStrike" dirty="0" err="1"/>
+              <a:t>api</a:t>
+            </a:r>
+            <a:r>
+              <a:rPr lang="en-US" sz="1200" strike="sngStrike" dirty="0"/>
+              <a:t> reflection of each </a:t>
+            </a:r>
+            <a:r>
+              <a:rPr lang="en-US" sz="1200" strike="sngStrike" dirty="0" err="1"/>
+              <a:t>postgres</a:t>
+            </a:r>
+            <a:r>
+              <a:rPr lang="en-US" sz="1200" strike="sngStrike" dirty="0"/>
+              <a:t> table</a:t>
+            </a:r>
+            <a:r>
               <a:rPr lang="en-US" sz="1200" dirty="0"/>
-              <a:t>Evan working on getting flask </a:t>
-            </a:r>
-            <a:r>
-              <a:rPr lang="en-US" sz="1200" dirty="0" err="1"/>
-              <a:t>api</a:t>
-            </a:r>
-            <a:r>
-              <a:rPr lang="en-US" sz="1200" dirty="0"/>
-              <a:t> reflection of each </a:t>
-            </a:r>
-            <a:r>
-              <a:rPr lang="en-US" sz="1200" dirty="0" err="1"/>
-              <a:t>postgres</a:t>
-            </a:r>
-            <a:r>
-              <a:rPr lang="en-US" sz="1200" dirty="0"/>
-              <a:t> table. </a:t>
+              <a:t>. </a:t>
             </a:r>
             <a:r>
               <a:rPr lang="en-US" sz="1200" dirty="0">
@@ -8027,7 +8034,15 @@
                   <a:srgbClr val="FF0000"/>
                 </a:solidFill>
               </a:rPr>
-              <a:t>Confirm output APIs are able to be imported to the JavaScript code. Convert the row objects into dictionary of dictionaries with key-value pairs. Need to reference the key name </a:t>
+              <a:t>Confirm output APIs are able to be imported to the JavaScript code. </a:t>
+            </a:r>
+            <a:r>
+              <a:rPr lang="en-US" sz="1200" strike="sngStrike" dirty="0">
+                <a:solidFill>
+                  <a:srgbClr val="FF0000"/>
+                </a:solidFill>
+              </a:rPr>
+              <a:t>Convert the row objects into dictionary of dictionaries with key-value pairs. Need to reference the key name </a:t>
             </a:r>
           </a:p>
           <a:p>
@@ -8362,7 +8377,7 @@
         <p:spPr>
           <a:xfrm>
             <a:off x="6191250" y="2131033"/>
-            <a:ext cx="5708963" cy="6524863"/>
+            <a:ext cx="5708963" cy="4585871"/>
           </a:xfrm>
           <a:prstGeom prst="rect">
             <a:avLst/>
@@ -8448,15 +8463,7 @@
             </a:pPr>
             <a:r>
               <a:rPr lang="en-US" dirty="0"/>
-              <a:t>Kevin needs help getting magnitude to display on the </a:t>
-            </a:r>
-            <a:r>
-              <a:rPr lang="en-US" dirty="0" err="1"/>
-              <a:t>leafly</a:t>
-            </a:r>
-            <a:r>
-              <a:rPr lang="en-US" dirty="0"/>
-              <a:t> heatmaps.</a:t>
+              <a:t>Kevin needs help getting magnitude to display on the leaflet heatmaps.</a:t>
             </a:r>
           </a:p>
           <a:p>
@@ -8508,27 +8515,6 @@
               <a:rPr lang="en-US" dirty="0"/>
               <a:t>Dropdown to switch between temperature and precipitation maps.</a:t>
             </a:r>
-          </a:p>
-          <a:p>
-            <a:endParaRPr lang="en-US" dirty="0"/>
-          </a:p>
-          <a:p>
-            <a:endParaRPr lang="en-US" dirty="0"/>
-          </a:p>
-          <a:p>
-            <a:endParaRPr lang="en-US" dirty="0"/>
-          </a:p>
-          <a:p>
-            <a:endParaRPr lang="en-US" dirty="0"/>
-          </a:p>
-          <a:p>
-            <a:endParaRPr lang="en-US" dirty="0"/>
-          </a:p>
-          <a:p>
-            <a:endParaRPr lang="en-US" dirty="0"/>
-          </a:p>
-          <a:p>
-            <a:endParaRPr lang="en-US" dirty="0"/>
           </a:p>
         </p:txBody>
       </p:sp>

</xml_diff>

<commit_message>
ERS: Formatting app.py and updating outline notes.
</commit_message>
<xml_diff>
--- a/Project_3_outline.pptx
+++ b/Project_3_outline.pptx
@@ -359,7 +359,7 @@
           <a:p>
             <a:fld id="{EDD99DFF-4D7C-4671-8EF0-23A72D1484EC}" type="datetimeFigureOut">
               <a:rPr lang="en-US" smtClean="0"/>
-              <a:t>7/25/2023</a:t>
+              <a:t>7/26/2023</a:t>
             </a:fld>
             <a:endParaRPr lang="en-US"/>
           </a:p>
@@ -671,7 +671,7 @@
           <a:p>
             <a:fld id="{EDD99DFF-4D7C-4671-8EF0-23A72D1484EC}" type="datetimeFigureOut">
               <a:rPr lang="en-US" smtClean="0"/>
-              <a:t>7/25/2023</a:t>
+              <a:t>7/26/2023</a:t>
             </a:fld>
             <a:endParaRPr lang="en-US"/>
           </a:p>
@@ -893,7 +893,7 @@
           <a:p>
             <a:fld id="{EDD99DFF-4D7C-4671-8EF0-23A72D1484EC}" type="datetimeFigureOut">
               <a:rPr lang="en-US" smtClean="0"/>
-              <a:t>7/25/2023</a:t>
+              <a:t>7/26/2023</a:t>
             </a:fld>
             <a:endParaRPr lang="en-US"/>
           </a:p>
@@ -1184,7 +1184,7 @@
           <a:p>
             <a:fld id="{EDD99DFF-4D7C-4671-8EF0-23A72D1484EC}" type="datetimeFigureOut">
               <a:rPr lang="en-US" smtClean="0"/>
-              <a:t>7/25/2023</a:t>
+              <a:t>7/26/2023</a:t>
             </a:fld>
             <a:endParaRPr lang="en-US"/>
           </a:p>
@@ -1638,7 +1638,7 @@
           <a:p>
             <a:fld id="{EDD99DFF-4D7C-4671-8EF0-23A72D1484EC}" type="datetimeFigureOut">
               <a:rPr lang="en-US" smtClean="0"/>
-              <a:t>7/25/2023</a:t>
+              <a:t>7/26/2023</a:t>
             </a:fld>
             <a:endParaRPr lang="en-US"/>
           </a:p>
@@ -2214,7 +2214,7 @@
           <a:p>
             <a:fld id="{EDD99DFF-4D7C-4671-8EF0-23A72D1484EC}" type="datetimeFigureOut">
               <a:rPr lang="en-US" smtClean="0"/>
-              <a:t>7/25/2023</a:t>
+              <a:t>7/26/2023</a:t>
             </a:fld>
             <a:endParaRPr lang="en-US"/>
           </a:p>
@@ -3066,7 +3066,7 @@
           <a:p>
             <a:fld id="{EDD99DFF-4D7C-4671-8EF0-23A72D1484EC}" type="datetimeFigureOut">
               <a:rPr lang="en-US" smtClean="0"/>
-              <a:t>7/25/2023</a:t>
+              <a:t>7/26/2023</a:t>
             </a:fld>
             <a:endParaRPr lang="en-US"/>
           </a:p>
@@ -3271,7 +3271,7 @@
           <a:p>
             <a:fld id="{EDD99DFF-4D7C-4671-8EF0-23A72D1484EC}" type="datetimeFigureOut">
               <a:rPr lang="en-US" smtClean="0"/>
-              <a:t>7/25/2023</a:t>
+              <a:t>7/26/2023</a:t>
             </a:fld>
             <a:endParaRPr lang="en-US"/>
           </a:p>
@@ -3485,7 +3485,7 @@
           <a:p>
             <a:fld id="{EDD99DFF-4D7C-4671-8EF0-23A72D1484EC}" type="datetimeFigureOut">
               <a:rPr lang="en-US" smtClean="0"/>
-              <a:t>7/25/2023</a:t>
+              <a:t>7/26/2023</a:t>
             </a:fld>
             <a:endParaRPr lang="en-US"/>
           </a:p>
@@ -3655,7 +3655,7 @@
           <a:p>
             <a:fld id="{EDD99DFF-4D7C-4671-8EF0-23A72D1484EC}" type="datetimeFigureOut">
               <a:rPr lang="en-US" smtClean="0"/>
-              <a:t>7/25/2023</a:t>
+              <a:t>7/26/2023</a:t>
             </a:fld>
             <a:endParaRPr lang="en-US"/>
           </a:p>
@@ -3860,7 +3860,7 @@
           <a:p>
             <a:fld id="{EDD99DFF-4D7C-4671-8EF0-23A72D1484EC}" type="datetimeFigureOut">
               <a:rPr lang="en-US" smtClean="0"/>
-              <a:t>7/25/2023</a:t>
+              <a:t>7/26/2023</a:t>
             </a:fld>
             <a:endParaRPr lang="en-US"/>
           </a:p>
@@ -4140,7 +4140,7 @@
           <a:p>
             <a:fld id="{EDD99DFF-4D7C-4671-8EF0-23A72D1484EC}" type="datetimeFigureOut">
               <a:rPr lang="en-US" smtClean="0"/>
-              <a:t>7/25/2023</a:t>
+              <a:t>7/26/2023</a:t>
             </a:fld>
             <a:endParaRPr lang="en-US"/>
           </a:p>
@@ -4407,7 +4407,7 @@
           <a:p>
             <a:fld id="{EDD99DFF-4D7C-4671-8EF0-23A72D1484EC}" type="datetimeFigureOut">
               <a:rPr lang="en-US" smtClean="0"/>
-              <a:t>7/25/2023</a:t>
+              <a:t>7/26/2023</a:t>
             </a:fld>
             <a:endParaRPr lang="en-US"/>
           </a:p>
@@ -4822,7 +4822,7 @@
           <a:p>
             <a:fld id="{EDD99DFF-4D7C-4671-8EF0-23A72D1484EC}" type="datetimeFigureOut">
               <a:rPr lang="en-US" smtClean="0"/>
-              <a:t>7/25/2023</a:t>
+              <a:t>7/26/2023</a:t>
             </a:fld>
             <a:endParaRPr lang="en-US"/>
           </a:p>
@@ -4970,7 +4970,7 @@
           <a:p>
             <a:fld id="{EDD99DFF-4D7C-4671-8EF0-23A72D1484EC}" type="datetimeFigureOut">
               <a:rPr lang="en-US" smtClean="0"/>
-              <a:t>7/25/2023</a:t>
+              <a:t>7/26/2023</a:t>
             </a:fld>
             <a:endParaRPr lang="en-US"/>
           </a:p>
@@ -5095,7 +5095,7 @@
           <a:p>
             <a:fld id="{EDD99DFF-4D7C-4671-8EF0-23A72D1484EC}" type="datetimeFigureOut">
               <a:rPr lang="en-US" smtClean="0"/>
-              <a:t>7/25/2023</a:t>
+              <a:t>7/26/2023</a:t>
             </a:fld>
             <a:endParaRPr lang="en-US"/>
           </a:p>
@@ -5374,7 +5374,7 @@
           <a:p>
             <a:fld id="{EDD99DFF-4D7C-4671-8EF0-23A72D1484EC}" type="datetimeFigureOut">
               <a:rPr lang="en-US" smtClean="0"/>
-              <a:t>7/25/2023</a:t>
+              <a:t>7/26/2023</a:t>
             </a:fld>
             <a:endParaRPr lang="en-US"/>
           </a:p>
@@ -5686,7 +5686,7 @@
           <a:p>
             <a:fld id="{EDD99DFF-4D7C-4671-8EF0-23A72D1484EC}" type="datetimeFigureOut">
               <a:rPr lang="en-US" smtClean="0"/>
-              <a:t>7/25/2023</a:t>
+              <a:t>7/26/2023</a:t>
             </a:fld>
             <a:endParaRPr lang="en-US"/>
           </a:p>
@@ -5939,7 +5939,7 @@
           <a:p>
             <a:fld id="{EDD99DFF-4D7C-4671-8EF0-23A72D1484EC}" type="datetimeFigureOut">
               <a:rPr lang="en-US" smtClean="0"/>
-              <a:t>7/25/2023</a:t>
+              <a:t>7/26/2023</a:t>
             </a:fld>
             <a:endParaRPr lang="en-US"/>
           </a:p>

</xml_diff>

<commit_message>
ERS: Adding Miranda's .sql, .ipynb and outputted data files. Update app.py for the reformatted data tables. Update readme for data load and setup instructions.
</commit_message>
<xml_diff>
--- a/Project_3_outline.pptx
+++ b/Project_3_outline.pptx
@@ -359,7 +359,7 @@
           <a:p>
             <a:fld id="{EDD99DFF-4D7C-4671-8EF0-23A72D1484EC}" type="datetimeFigureOut">
               <a:rPr lang="en-US" smtClean="0"/>
-              <a:t>7/26/2023</a:t>
+              <a:t>7/27/2023</a:t>
             </a:fld>
             <a:endParaRPr lang="en-US"/>
           </a:p>
@@ -671,7 +671,7 @@
           <a:p>
             <a:fld id="{EDD99DFF-4D7C-4671-8EF0-23A72D1484EC}" type="datetimeFigureOut">
               <a:rPr lang="en-US" smtClean="0"/>
-              <a:t>7/26/2023</a:t>
+              <a:t>7/27/2023</a:t>
             </a:fld>
             <a:endParaRPr lang="en-US"/>
           </a:p>
@@ -893,7 +893,7 @@
           <a:p>
             <a:fld id="{EDD99DFF-4D7C-4671-8EF0-23A72D1484EC}" type="datetimeFigureOut">
               <a:rPr lang="en-US" smtClean="0"/>
-              <a:t>7/26/2023</a:t>
+              <a:t>7/27/2023</a:t>
             </a:fld>
             <a:endParaRPr lang="en-US"/>
           </a:p>
@@ -1184,7 +1184,7 @@
           <a:p>
             <a:fld id="{EDD99DFF-4D7C-4671-8EF0-23A72D1484EC}" type="datetimeFigureOut">
               <a:rPr lang="en-US" smtClean="0"/>
-              <a:t>7/26/2023</a:t>
+              <a:t>7/27/2023</a:t>
             </a:fld>
             <a:endParaRPr lang="en-US"/>
           </a:p>
@@ -1638,7 +1638,7 @@
           <a:p>
             <a:fld id="{EDD99DFF-4D7C-4671-8EF0-23A72D1484EC}" type="datetimeFigureOut">
               <a:rPr lang="en-US" smtClean="0"/>
-              <a:t>7/26/2023</a:t>
+              <a:t>7/27/2023</a:t>
             </a:fld>
             <a:endParaRPr lang="en-US"/>
           </a:p>
@@ -2214,7 +2214,7 @@
           <a:p>
             <a:fld id="{EDD99DFF-4D7C-4671-8EF0-23A72D1484EC}" type="datetimeFigureOut">
               <a:rPr lang="en-US" smtClean="0"/>
-              <a:t>7/26/2023</a:t>
+              <a:t>7/27/2023</a:t>
             </a:fld>
             <a:endParaRPr lang="en-US"/>
           </a:p>
@@ -3066,7 +3066,7 @@
           <a:p>
             <a:fld id="{EDD99DFF-4D7C-4671-8EF0-23A72D1484EC}" type="datetimeFigureOut">
               <a:rPr lang="en-US" smtClean="0"/>
-              <a:t>7/26/2023</a:t>
+              <a:t>7/27/2023</a:t>
             </a:fld>
             <a:endParaRPr lang="en-US"/>
           </a:p>
@@ -3271,7 +3271,7 @@
           <a:p>
             <a:fld id="{EDD99DFF-4D7C-4671-8EF0-23A72D1484EC}" type="datetimeFigureOut">
               <a:rPr lang="en-US" smtClean="0"/>
-              <a:t>7/26/2023</a:t>
+              <a:t>7/27/2023</a:t>
             </a:fld>
             <a:endParaRPr lang="en-US"/>
           </a:p>
@@ -3485,7 +3485,7 @@
           <a:p>
             <a:fld id="{EDD99DFF-4D7C-4671-8EF0-23A72D1484EC}" type="datetimeFigureOut">
               <a:rPr lang="en-US" smtClean="0"/>
-              <a:t>7/26/2023</a:t>
+              <a:t>7/27/2023</a:t>
             </a:fld>
             <a:endParaRPr lang="en-US"/>
           </a:p>
@@ -3655,7 +3655,7 @@
           <a:p>
             <a:fld id="{EDD99DFF-4D7C-4671-8EF0-23A72D1484EC}" type="datetimeFigureOut">
               <a:rPr lang="en-US" smtClean="0"/>
-              <a:t>7/26/2023</a:t>
+              <a:t>7/27/2023</a:t>
             </a:fld>
             <a:endParaRPr lang="en-US"/>
           </a:p>
@@ -3860,7 +3860,7 @@
           <a:p>
             <a:fld id="{EDD99DFF-4D7C-4671-8EF0-23A72D1484EC}" type="datetimeFigureOut">
               <a:rPr lang="en-US" smtClean="0"/>
-              <a:t>7/26/2023</a:t>
+              <a:t>7/27/2023</a:t>
             </a:fld>
             <a:endParaRPr lang="en-US"/>
           </a:p>
@@ -4140,7 +4140,7 @@
           <a:p>
             <a:fld id="{EDD99DFF-4D7C-4671-8EF0-23A72D1484EC}" type="datetimeFigureOut">
               <a:rPr lang="en-US" smtClean="0"/>
-              <a:t>7/26/2023</a:t>
+              <a:t>7/27/2023</a:t>
             </a:fld>
             <a:endParaRPr lang="en-US"/>
           </a:p>
@@ -4407,7 +4407,7 @@
           <a:p>
             <a:fld id="{EDD99DFF-4D7C-4671-8EF0-23A72D1484EC}" type="datetimeFigureOut">
               <a:rPr lang="en-US" smtClean="0"/>
-              <a:t>7/26/2023</a:t>
+              <a:t>7/27/2023</a:t>
             </a:fld>
             <a:endParaRPr lang="en-US"/>
           </a:p>
@@ -4822,7 +4822,7 @@
           <a:p>
             <a:fld id="{EDD99DFF-4D7C-4671-8EF0-23A72D1484EC}" type="datetimeFigureOut">
               <a:rPr lang="en-US" smtClean="0"/>
-              <a:t>7/26/2023</a:t>
+              <a:t>7/27/2023</a:t>
             </a:fld>
             <a:endParaRPr lang="en-US"/>
           </a:p>
@@ -4970,7 +4970,7 @@
           <a:p>
             <a:fld id="{EDD99DFF-4D7C-4671-8EF0-23A72D1484EC}" type="datetimeFigureOut">
               <a:rPr lang="en-US" smtClean="0"/>
-              <a:t>7/26/2023</a:t>
+              <a:t>7/27/2023</a:t>
             </a:fld>
             <a:endParaRPr lang="en-US"/>
           </a:p>
@@ -5095,7 +5095,7 @@
           <a:p>
             <a:fld id="{EDD99DFF-4D7C-4671-8EF0-23A72D1484EC}" type="datetimeFigureOut">
               <a:rPr lang="en-US" smtClean="0"/>
-              <a:t>7/26/2023</a:t>
+              <a:t>7/27/2023</a:t>
             </a:fld>
             <a:endParaRPr lang="en-US"/>
           </a:p>
@@ -5374,7 +5374,7 @@
           <a:p>
             <a:fld id="{EDD99DFF-4D7C-4671-8EF0-23A72D1484EC}" type="datetimeFigureOut">
               <a:rPr lang="en-US" smtClean="0"/>
-              <a:t>7/26/2023</a:t>
+              <a:t>7/27/2023</a:t>
             </a:fld>
             <a:endParaRPr lang="en-US"/>
           </a:p>
@@ -5686,7 +5686,7 @@
           <a:p>
             <a:fld id="{EDD99DFF-4D7C-4671-8EF0-23A72D1484EC}" type="datetimeFigureOut">
               <a:rPr lang="en-US" smtClean="0"/>
-              <a:t>7/26/2023</a:t>
+              <a:t>7/27/2023</a:t>
             </a:fld>
             <a:endParaRPr lang="en-US"/>
           </a:p>
@@ -5939,7 +5939,7 @@
           <a:p>
             <a:fld id="{EDD99DFF-4D7C-4671-8EF0-23A72D1484EC}" type="datetimeFigureOut">
               <a:rPr lang="en-US" smtClean="0"/>
-              <a:t>7/26/2023</a:t>
+              <a:t>7/27/2023</a:t>
             </a:fld>
             <a:endParaRPr lang="en-US"/>
           </a:p>

</xml_diff>